<commit_message>
add format pdf file.
</commit_message>
<xml_diff>
--- a/就職指導週間（大橋校講義用PP）.pptx
+++ b/就職指導週間（大橋校講義用PP）.pptx
@@ -7,6 +7,9 @@
   <p:notesMasterIdLst>
     <p:notesMasterId r:id="rId29"/>
   </p:notesMasterIdLst>
+  <p:handoutMasterIdLst>
+    <p:handoutMasterId r:id="rId30"/>
+  </p:handoutMasterIdLst>
   <p:sldIdLst>
     <p:sldId id="256" r:id="rId2"/>
     <p:sldId id="281" r:id="rId3"/>
@@ -37,7 +40,7 @@
     <p:sldId id="276" r:id="rId28"/>
   </p:sldIdLst>
   <p:sldSz cx="9144000" cy="6858000" type="screen4x3"/>
-  <p:notesSz cx="6858000" cy="9144000"/>
+  <p:notesSz cx="6797675" cy="9926638"/>
   <p:defaultTextStyle>
     <a:defPPr>
       <a:defRPr lang="ja-JP"/>
@@ -189,6 +192,171 @@
 </p:presentation>
 </file>
 
+<file path=ppt/handoutMasters/handoutMaster1.xml><?xml version="1.0" encoding="utf-8"?>
+<p:handoutMaster xmlns:a="http://schemas.openxmlformats.org/drawingml/2006/main" xmlns:r="http://schemas.openxmlformats.org/officeDocument/2006/relationships" xmlns:p="http://schemas.openxmlformats.org/presentationml/2006/main">
+  <p:cSld>
+    <p:bg>
+      <p:bgRef idx="1001">
+        <a:schemeClr val="bg1"/>
+      </p:bgRef>
+    </p:bg>
+    <p:spTree>
+      <p:nvGrpSpPr>
+        <p:cNvPr id="1" name=""/>
+        <p:cNvGrpSpPr/>
+        <p:nvPr/>
+      </p:nvGrpSpPr>
+      <p:grpSpPr>
+        <a:xfrm>
+          <a:off x="0" y="0"/>
+          <a:ext cx="0" cy="0"/>
+          <a:chOff x="0" y="0"/>
+          <a:chExt cx="0" cy="0"/>
+        </a:xfrm>
+      </p:grpSpPr>
+      <p:sp>
+        <p:nvSpPr>
+          <p:cNvPr id="2" name="ヘッダー プレースホルダー 1"/>
+          <p:cNvSpPr>
+            <a:spLocks noGrp="1"/>
+          </p:cNvSpPr>
+          <p:nvPr>
+            <p:ph type="hdr" sz="quarter"/>
+          </p:nvPr>
+        </p:nvSpPr>
+        <p:spPr>
+          <a:xfrm>
+            <a:off x="0" y="0"/>
+            <a:ext cx="2945659" cy="496332"/>
+          </a:xfrm>
+          <a:prstGeom prst="rect">
+            <a:avLst/>
+          </a:prstGeom>
+        </p:spPr>
+        <p:txBody>
+          <a:bodyPr vert="horz" lIns="91440" tIns="45720" rIns="91440" bIns="45720" rtlCol="0"/>
+          <a:lstStyle>
+            <a:lvl1pPr algn="l">
+              <a:defRPr sz="1200"/>
+            </a:lvl1pPr>
+          </a:lstStyle>
+          <a:p>
+            <a:endParaRPr kumimoji="1" lang="ja-JP" altLang="en-US"/>
+          </a:p>
+        </p:txBody>
+      </p:sp>
+      <p:sp>
+        <p:nvSpPr>
+          <p:cNvPr id="3" name="日付プレースホルダー 2"/>
+          <p:cNvSpPr>
+            <a:spLocks noGrp="1"/>
+          </p:cNvSpPr>
+          <p:nvPr>
+            <p:ph type="dt" sz="quarter" idx="1"/>
+          </p:nvPr>
+        </p:nvSpPr>
+        <p:spPr>
+          <a:xfrm>
+            <a:off x="3850443" y="0"/>
+            <a:ext cx="2945659" cy="496332"/>
+          </a:xfrm>
+          <a:prstGeom prst="rect">
+            <a:avLst/>
+          </a:prstGeom>
+        </p:spPr>
+        <p:txBody>
+          <a:bodyPr vert="horz" lIns="91440" tIns="45720" rIns="91440" bIns="45720" rtlCol="0"/>
+          <a:lstStyle>
+            <a:lvl1pPr algn="r">
+              <a:defRPr sz="1200"/>
+            </a:lvl1pPr>
+          </a:lstStyle>
+          <a:p>
+            <a:fld id="{087063C6-416F-4F6D-9AA8-D599296D1EFA}" type="datetimeFigureOut">
+              <a:rPr kumimoji="1" lang="ja-JP" altLang="en-US" smtClean="0"/>
+              <a:t>2018/1/27</a:t>
+            </a:fld>
+            <a:endParaRPr kumimoji="1" lang="ja-JP" altLang="en-US"/>
+          </a:p>
+        </p:txBody>
+      </p:sp>
+      <p:sp>
+        <p:nvSpPr>
+          <p:cNvPr id="4" name="フッター プレースホルダー 3"/>
+          <p:cNvSpPr>
+            <a:spLocks noGrp="1"/>
+          </p:cNvSpPr>
+          <p:nvPr>
+            <p:ph type="ftr" sz="quarter" idx="2"/>
+          </p:nvPr>
+        </p:nvSpPr>
+        <p:spPr>
+          <a:xfrm>
+            <a:off x="0" y="9428583"/>
+            <a:ext cx="2945659" cy="496332"/>
+          </a:xfrm>
+          <a:prstGeom prst="rect">
+            <a:avLst/>
+          </a:prstGeom>
+        </p:spPr>
+        <p:txBody>
+          <a:bodyPr vert="horz" lIns="91440" tIns="45720" rIns="91440" bIns="45720" rtlCol="0" anchor="b"/>
+          <a:lstStyle>
+            <a:lvl1pPr algn="l">
+              <a:defRPr sz="1200"/>
+            </a:lvl1pPr>
+          </a:lstStyle>
+          <a:p>
+            <a:endParaRPr kumimoji="1" lang="ja-JP" altLang="en-US"/>
+          </a:p>
+        </p:txBody>
+      </p:sp>
+      <p:sp>
+        <p:nvSpPr>
+          <p:cNvPr id="5" name="スライド番号プレースホルダー 4"/>
+          <p:cNvSpPr>
+            <a:spLocks noGrp="1"/>
+          </p:cNvSpPr>
+          <p:nvPr>
+            <p:ph type="sldNum" sz="quarter" idx="3"/>
+          </p:nvPr>
+        </p:nvSpPr>
+        <p:spPr>
+          <a:xfrm>
+            <a:off x="3850443" y="9428583"/>
+            <a:ext cx="2945659" cy="496332"/>
+          </a:xfrm>
+          <a:prstGeom prst="rect">
+            <a:avLst/>
+          </a:prstGeom>
+        </p:spPr>
+        <p:txBody>
+          <a:bodyPr vert="horz" lIns="91440" tIns="45720" rIns="91440" bIns="45720" rtlCol="0" anchor="b"/>
+          <a:lstStyle>
+            <a:lvl1pPr algn="r">
+              <a:defRPr sz="1200"/>
+            </a:lvl1pPr>
+          </a:lstStyle>
+          <a:p>
+            <a:fld id="{4256E00B-AB8D-4EA7-B6FA-126965F64AE3}" type="slidenum">
+              <a:rPr kumimoji="1" lang="ja-JP" altLang="en-US" smtClean="0"/>
+              <a:t>‹#›</a:t>
+            </a:fld>
+            <a:endParaRPr kumimoji="1" lang="ja-JP" altLang="en-US"/>
+          </a:p>
+        </p:txBody>
+      </p:sp>
+    </p:spTree>
+    <p:extLst>
+      <p:ext uri="{BB962C8B-B14F-4D97-AF65-F5344CB8AC3E}">
+        <p14:creationId xmlns:p14="http://schemas.microsoft.com/office/powerpoint/2010/main" val="563652354"/>
+      </p:ext>
+    </p:extLst>
+  </p:cSld>
+  <p:clrMap bg1="lt1" tx1="dk1" bg2="lt2" tx2="dk2" accent1="accent1" accent2="accent2" accent3="accent3" accent4="accent4" accent5="accent5" accent6="accent6" hlink="hlink" folHlink="folHlink"/>
+</p:handoutMaster>
+</file>
+
 <file path=ppt/notesMasters/notesMaster1.xml><?xml version="1.0" encoding="utf-8"?>
 <p:notesMaster xmlns:a="http://schemas.openxmlformats.org/drawingml/2006/main" xmlns:r="http://schemas.openxmlformats.org/officeDocument/2006/relationships" xmlns:p="http://schemas.openxmlformats.org/presentationml/2006/main">
   <p:cSld>
@@ -224,7 +392,7 @@
         <p:spPr>
           <a:xfrm>
             <a:off x="0" y="0"/>
-            <a:ext cx="2971800" cy="457200"/>
+            <a:ext cx="2945659" cy="496332"/>
           </a:xfrm>
           <a:prstGeom prst="rect">
             <a:avLst/>
@@ -254,8 +422,8 @@
         </p:nvSpPr>
         <p:spPr>
           <a:xfrm>
-            <a:off x="3884613" y="0"/>
-            <a:ext cx="2971800" cy="457200"/>
+            <a:off x="3850443" y="0"/>
+            <a:ext cx="2945659" cy="496332"/>
           </a:xfrm>
           <a:prstGeom prst="rect">
             <a:avLst/>
@@ -289,8 +457,8 @@
         </p:nvSpPr>
         <p:spPr>
           <a:xfrm>
-            <a:off x="1143000" y="685800"/>
-            <a:ext cx="4572000" cy="3429000"/>
+            <a:off x="917575" y="744538"/>
+            <a:ext cx="4962525" cy="3722687"/>
           </a:xfrm>
           <a:prstGeom prst="rect">
             <a:avLst/>
@@ -322,8 +490,8 @@
         </p:nvSpPr>
         <p:spPr>
           <a:xfrm>
-            <a:off x="685800" y="4343400"/>
-            <a:ext cx="5486400" cy="4114800"/>
+            <a:off x="679768" y="4715153"/>
+            <a:ext cx="5438140" cy="4466987"/>
           </a:xfrm>
           <a:prstGeom prst="rect">
             <a:avLst/>
@@ -414,8 +582,8 @@
         </p:nvSpPr>
         <p:spPr>
           <a:xfrm>
-            <a:off x="0" y="8685213"/>
-            <a:ext cx="2971800" cy="457200"/>
+            <a:off x="0" y="9428583"/>
+            <a:ext cx="2945659" cy="496332"/>
           </a:xfrm>
           <a:prstGeom prst="rect">
             <a:avLst/>
@@ -445,8 +613,8 @@
         </p:nvSpPr>
         <p:spPr>
           <a:xfrm>
-            <a:off x="3884613" y="8685213"/>
-            <a:ext cx="2971800" cy="457200"/>
+            <a:off x="3850443" y="9428583"/>
+            <a:ext cx="2945659" cy="496332"/>
           </a:xfrm>
           <a:prstGeom prst="rect">
             <a:avLst/>
@@ -5045,21 +5213,36 @@
           <a:lstStyle/>
           <a:p>
             <a:r>
-              <a:rPr kumimoji="1" lang="ja-JP" altLang="en-US" dirty="0" smtClean="0"/>
+              <a:rPr kumimoji="1" lang="ja-JP" altLang="en-US" baseline="0" dirty="0" smtClean="0">
+                <a:latin typeface="ＭＳ ゴシック" panose="020B0609070205080204" pitchFamily="49" charset="-128"/>
+                <a:ea typeface="ＭＳ ゴシック" panose="020B0609070205080204" pitchFamily="49" charset="-128"/>
+              </a:rPr>
               <a:t>就職指導週間</a:t>
             </a:r>
             <a:r>
-              <a:rPr kumimoji="1" lang="en-US" altLang="ja-JP" dirty="0" smtClean="0"/>
+              <a:rPr kumimoji="1" lang="en-US" altLang="ja-JP" baseline="0" dirty="0" smtClean="0">
+                <a:latin typeface="ＭＳ ゴシック" panose="020B0609070205080204" pitchFamily="49" charset="-128"/>
+                <a:ea typeface="ＭＳ ゴシック" panose="020B0609070205080204" pitchFamily="49" charset="-128"/>
+              </a:rPr>
               <a:t/>
             </a:r>
             <a:br>
-              <a:rPr kumimoji="1" lang="en-US" altLang="ja-JP" dirty="0" smtClean="0"/>
+              <a:rPr kumimoji="1" lang="en-US" altLang="ja-JP" baseline="0" dirty="0" smtClean="0">
+                <a:latin typeface="ＭＳ ゴシック" panose="020B0609070205080204" pitchFamily="49" charset="-128"/>
+                <a:ea typeface="ＭＳ ゴシック" panose="020B0609070205080204" pitchFamily="49" charset="-128"/>
+              </a:rPr>
             </a:br>
             <a:r>
-              <a:rPr lang="ja-JP" altLang="en-US" dirty="0"/>
+              <a:rPr lang="ja-JP" altLang="en-US" baseline="0" dirty="0">
+                <a:latin typeface="ＭＳ ゴシック" panose="020B0609070205080204" pitchFamily="49" charset="-128"/>
+                <a:ea typeface="ＭＳ ゴシック" panose="020B0609070205080204" pitchFamily="49" charset="-128"/>
+              </a:rPr>
               <a:t>講義資料</a:t>
             </a:r>
-            <a:endParaRPr kumimoji="1" lang="ja-JP" altLang="en-US" dirty="0"/>
+            <a:endParaRPr kumimoji="1" lang="ja-JP" altLang="en-US" baseline="0" dirty="0">
+              <a:latin typeface="ＭＳ ゴシック" panose="020B0609070205080204" pitchFamily="49" charset="-128"/>
+              <a:ea typeface="ＭＳ ゴシック" panose="020B0609070205080204" pitchFamily="49" charset="-128"/>
+            </a:endParaRPr>
           </a:p>
         </p:txBody>
       </p:sp>
@@ -5081,17 +5264,29 @@
           <a:lstStyle/>
           <a:p>
             <a:r>
-              <a:rPr kumimoji="1" lang="ja-JP" altLang="en-US" dirty="0" smtClean="0"/>
+              <a:rPr kumimoji="1" lang="ja-JP" altLang="en-US" baseline="0" dirty="0" smtClean="0">
+                <a:latin typeface="ＭＳ ゴシック" panose="020B0609070205080204" pitchFamily="49" charset="-128"/>
+                <a:ea typeface="ＭＳ ゴシック" panose="020B0609070205080204" pitchFamily="49" charset="-128"/>
+              </a:rPr>
               <a:t>専門学校コンピュータ教育学院</a:t>
             </a:r>
-            <a:endParaRPr kumimoji="1" lang="en-US" altLang="ja-JP" dirty="0" smtClean="0"/>
-          </a:p>
-          <a:p>
-            <a:r>
-              <a:rPr lang="ja-JP" altLang="en-US" dirty="0" smtClean="0"/>
+            <a:endParaRPr kumimoji="1" lang="en-US" altLang="ja-JP" baseline="0" dirty="0" smtClean="0">
+              <a:latin typeface="ＭＳ ゴシック" panose="020B0609070205080204" pitchFamily="49" charset="-128"/>
+              <a:ea typeface="ＭＳ ゴシック" panose="020B0609070205080204" pitchFamily="49" charset="-128"/>
+            </a:endParaRPr>
+          </a:p>
+          <a:p>
+            <a:r>
+              <a:rPr lang="ja-JP" altLang="en-US" baseline="0" dirty="0" smtClean="0">
+                <a:latin typeface="ＭＳ ゴシック" panose="020B0609070205080204" pitchFamily="49" charset="-128"/>
+                <a:ea typeface="ＭＳ ゴシック" panose="020B0609070205080204" pitchFamily="49" charset="-128"/>
+              </a:rPr>
               <a:t>大橋校</a:t>
             </a:r>
-            <a:endParaRPr lang="en-US" altLang="ja-JP" dirty="0" smtClean="0"/>
+            <a:endParaRPr lang="en-US" altLang="ja-JP" baseline="0" dirty="0" smtClean="0">
+              <a:latin typeface="ＭＳ ゴシック" panose="020B0609070205080204" pitchFamily="49" charset="-128"/>
+              <a:ea typeface="ＭＳ ゴシック" panose="020B0609070205080204" pitchFamily="49" charset="-128"/>
+            </a:endParaRPr>
           </a:p>
         </p:txBody>
       </p:sp>
@@ -5105,6 +5300,13 @@
   <p:clrMapOvr>
     <a:masterClrMapping/>
   </p:clrMapOvr>
+  <p:timing>
+    <p:tnLst>
+      <p:par>
+        <p:cTn id="1" dur="indefinite" restart="never" nodeType="tmRoot"/>
+      </p:par>
+    </p:tnLst>
+  </p:timing>
 </p:sld>
 </file>
 
@@ -5141,10 +5343,16 @@
           <a:lstStyle/>
           <a:p>
             <a:r>
-              <a:rPr kumimoji="1" lang="ja-JP" altLang="en-US" dirty="0" smtClean="0"/>
+              <a:rPr kumimoji="1" lang="ja-JP" altLang="en-US" baseline="0" dirty="0" smtClean="0">
+                <a:latin typeface="ＭＳ ゴシック" panose="020B0609070205080204" pitchFamily="49" charset="-128"/>
+                <a:ea typeface="ＭＳ ゴシック" panose="020B0609070205080204" pitchFamily="49" charset="-128"/>
+              </a:rPr>
               <a:t>学内求人の基準</a:t>
             </a:r>
-            <a:endParaRPr kumimoji="1" lang="ja-JP" altLang="en-US" dirty="0"/>
+            <a:endParaRPr kumimoji="1" lang="ja-JP" altLang="en-US" baseline="0" dirty="0">
+              <a:latin typeface="ＭＳ ゴシック" panose="020B0609070205080204" pitchFamily="49" charset="-128"/>
+              <a:ea typeface="ＭＳ ゴシック" panose="020B0609070205080204" pitchFamily="49" charset="-128"/>
+            </a:endParaRPr>
           </a:p>
         </p:txBody>
       </p:sp>
@@ -5215,10 +5423,16 @@
           <a:lstStyle/>
           <a:p>
             <a:r>
-              <a:rPr kumimoji="1" lang="ja-JP" altLang="en-US" dirty="0" smtClean="0"/>
+              <a:rPr kumimoji="1" lang="ja-JP" altLang="en-US" baseline="0" dirty="0" smtClean="0">
+                <a:latin typeface="ＭＳ ゴシック" panose="020B0609070205080204" pitchFamily="49" charset="-128"/>
+                <a:ea typeface="ＭＳ ゴシック" panose="020B0609070205080204" pitchFamily="49" charset="-128"/>
+              </a:rPr>
               <a:t>学校求人応募の流れ</a:t>
             </a:r>
-            <a:endParaRPr kumimoji="1" lang="ja-JP" altLang="en-US" dirty="0"/>
+            <a:endParaRPr kumimoji="1" lang="ja-JP" altLang="en-US" baseline="0" dirty="0">
+              <a:latin typeface="ＭＳ ゴシック" panose="020B0609070205080204" pitchFamily="49" charset="-128"/>
+              <a:ea typeface="ＭＳ ゴシック" panose="020B0609070205080204" pitchFamily="49" charset="-128"/>
+            </a:endParaRPr>
           </a:p>
         </p:txBody>
       </p:sp>
@@ -5238,10 +5452,16 @@
           <a:lstStyle/>
           <a:p>
             <a:r>
-              <a:rPr kumimoji="1" lang="ja-JP" altLang="en-US" dirty="0" smtClean="0"/>
+              <a:rPr kumimoji="1" lang="ja-JP" altLang="en-US" baseline="0" dirty="0" smtClean="0">
+                <a:latin typeface="ＭＳ ゴシック" panose="020B0609070205080204" pitchFamily="49" charset="-128"/>
+                <a:ea typeface="ＭＳ ゴシック" panose="020B0609070205080204" pitchFamily="49" charset="-128"/>
+              </a:rPr>
               <a:t>応募から試験まで</a:t>
             </a:r>
-            <a:endParaRPr kumimoji="1" lang="ja-JP" altLang="en-US" dirty="0"/>
+            <a:endParaRPr kumimoji="1" lang="ja-JP" altLang="en-US" baseline="0" dirty="0">
+              <a:latin typeface="ＭＳ ゴシック" panose="020B0609070205080204" pitchFamily="49" charset="-128"/>
+              <a:ea typeface="ＭＳ ゴシック" panose="020B0609070205080204" pitchFamily="49" charset="-128"/>
+            </a:endParaRPr>
           </a:p>
         </p:txBody>
       </p:sp>
@@ -5291,10 +5511,16 @@
           <a:lstStyle/>
           <a:p>
             <a:r>
-              <a:rPr kumimoji="1" lang="ja-JP" altLang="en-US" dirty="0" smtClean="0"/>
+              <a:rPr kumimoji="1" lang="ja-JP" altLang="en-US" baseline="0" dirty="0" smtClean="0">
+                <a:latin typeface="ＭＳ ゴシック" panose="020B0609070205080204" pitchFamily="49" charset="-128"/>
+                <a:ea typeface="ＭＳ ゴシック" panose="020B0609070205080204" pitchFamily="49" charset="-128"/>
+              </a:rPr>
               <a:t>学校求人応募の流れ（２）</a:t>
             </a:r>
-            <a:endParaRPr kumimoji="1" lang="ja-JP" altLang="en-US" dirty="0"/>
+            <a:endParaRPr kumimoji="1" lang="ja-JP" altLang="en-US" baseline="0" dirty="0">
+              <a:latin typeface="ＭＳ ゴシック" panose="020B0609070205080204" pitchFamily="49" charset="-128"/>
+              <a:ea typeface="ＭＳ ゴシック" panose="020B0609070205080204" pitchFamily="49" charset="-128"/>
+            </a:endParaRPr>
           </a:p>
         </p:txBody>
       </p:sp>
@@ -5314,10 +5540,16 @@
           <a:lstStyle/>
           <a:p>
             <a:r>
-              <a:rPr kumimoji="1" lang="ja-JP" altLang="en-US" dirty="0" smtClean="0"/>
+              <a:rPr kumimoji="1" lang="ja-JP" altLang="en-US" baseline="0" dirty="0" smtClean="0">
+                <a:latin typeface="ＭＳ ゴシック" panose="020B0609070205080204" pitchFamily="49" charset="-128"/>
+                <a:ea typeface="ＭＳ ゴシック" panose="020B0609070205080204" pitchFamily="49" charset="-128"/>
+              </a:rPr>
               <a:t>内定後の処理</a:t>
             </a:r>
-            <a:endParaRPr kumimoji="1" lang="en-US" altLang="ja-JP" dirty="0" smtClean="0"/>
+            <a:endParaRPr kumimoji="1" lang="en-US" altLang="ja-JP" baseline="0" dirty="0" smtClean="0">
+              <a:latin typeface="ＭＳ ゴシック" panose="020B0609070205080204" pitchFamily="49" charset="-128"/>
+              <a:ea typeface="ＭＳ ゴシック" panose="020B0609070205080204" pitchFamily="49" charset="-128"/>
+            </a:endParaRPr>
           </a:p>
         </p:txBody>
       </p:sp>
@@ -5367,10 +5599,16 @@
           <a:lstStyle/>
           <a:p>
             <a:r>
-              <a:rPr kumimoji="1" lang="ja-JP" altLang="en-US" dirty="0" smtClean="0"/>
+              <a:rPr kumimoji="1" lang="ja-JP" altLang="en-US" baseline="0" dirty="0" smtClean="0">
+                <a:latin typeface="ＭＳ ゴシック" panose="020B0609070205080204" pitchFamily="49" charset="-128"/>
+                <a:ea typeface="ＭＳ ゴシック" panose="020B0609070205080204" pitchFamily="49" charset="-128"/>
+              </a:rPr>
               <a:t>就職の応募時に注意する事</a:t>
             </a:r>
-            <a:endParaRPr kumimoji="1" lang="ja-JP" altLang="en-US" dirty="0"/>
+            <a:endParaRPr kumimoji="1" lang="ja-JP" altLang="en-US" baseline="0" dirty="0">
+              <a:latin typeface="ＭＳ ゴシック" panose="020B0609070205080204" pitchFamily="49" charset="-128"/>
+              <a:ea typeface="ＭＳ ゴシック" panose="020B0609070205080204" pitchFamily="49" charset="-128"/>
+            </a:endParaRPr>
           </a:p>
         </p:txBody>
       </p:sp>
@@ -5439,10 +5677,16 @@
           <a:lstStyle/>
           <a:p>
             <a:r>
-              <a:rPr kumimoji="1" lang="ja-JP" altLang="en-US" dirty="0" smtClean="0"/>
+              <a:rPr kumimoji="1" lang="ja-JP" altLang="en-US" baseline="0" dirty="0" smtClean="0">
+                <a:latin typeface="ＭＳ ゴシック" panose="020B0609070205080204" pitchFamily="49" charset="-128"/>
+                <a:ea typeface="ＭＳ ゴシック" panose="020B0609070205080204" pitchFamily="49" charset="-128"/>
+              </a:rPr>
               <a:t>早期出社について</a:t>
             </a:r>
-            <a:endParaRPr kumimoji="1" lang="ja-JP" altLang="en-US" dirty="0"/>
+            <a:endParaRPr kumimoji="1" lang="ja-JP" altLang="en-US" baseline="0" dirty="0">
+              <a:latin typeface="ＭＳ ゴシック" panose="020B0609070205080204" pitchFamily="49" charset="-128"/>
+              <a:ea typeface="ＭＳ ゴシック" panose="020B0609070205080204" pitchFamily="49" charset="-128"/>
+            </a:endParaRPr>
           </a:p>
         </p:txBody>
       </p:sp>
@@ -5462,10 +5706,16 @@
           <a:lstStyle/>
           <a:p>
             <a:r>
-              <a:rPr kumimoji="1" lang="ja-JP" altLang="en-US" dirty="0" smtClean="0"/>
+              <a:rPr kumimoji="1" lang="ja-JP" altLang="en-US" baseline="0" dirty="0" smtClean="0">
+                <a:latin typeface="ＭＳ ゴシック" panose="020B0609070205080204" pitchFamily="49" charset="-128"/>
+                <a:ea typeface="ＭＳ ゴシック" panose="020B0609070205080204" pitchFamily="49" charset="-128"/>
+              </a:rPr>
               <a:t>早期出社はできない為、就職応募時に担任に相談する事。</a:t>
             </a:r>
-            <a:endParaRPr kumimoji="1" lang="en-US" altLang="ja-JP" dirty="0" smtClean="0"/>
+            <a:endParaRPr kumimoji="1" lang="en-US" altLang="ja-JP" baseline="0" dirty="0" smtClean="0">
+              <a:latin typeface="ＭＳ ゴシック" panose="020B0609070205080204" pitchFamily="49" charset="-128"/>
+              <a:ea typeface="ＭＳ ゴシック" panose="020B0609070205080204" pitchFamily="49" charset="-128"/>
+            </a:endParaRPr>
           </a:p>
         </p:txBody>
       </p:sp>
@@ -5516,10 +5766,16 @@
           <a:p>
             <a:pPr lvl="0"/>
             <a:r>
-              <a:rPr kumimoji="1" lang="ja-JP" altLang="en-US" dirty="0" smtClean="0"/>
+              <a:rPr kumimoji="1" lang="ja-JP" altLang="en-US" baseline="0" dirty="0" smtClean="0">
+                <a:latin typeface="ＭＳ ゴシック" panose="020B0609070205080204" pitchFamily="49" charset="-128"/>
+                <a:ea typeface="ＭＳ ゴシック" panose="020B0609070205080204" pitchFamily="49" charset="-128"/>
+              </a:rPr>
               <a:t>証明書の発行期間・条件</a:t>
             </a:r>
-            <a:endParaRPr kumimoji="1" lang="ja-JP" altLang="en-US" dirty="0"/>
+            <a:endParaRPr kumimoji="1" lang="ja-JP" altLang="en-US" baseline="0" dirty="0">
+              <a:latin typeface="ＭＳ ゴシック" panose="020B0609070205080204" pitchFamily="49" charset="-128"/>
+              <a:ea typeface="ＭＳ ゴシック" panose="020B0609070205080204" pitchFamily="49" charset="-128"/>
+            </a:endParaRPr>
           </a:p>
         </p:txBody>
       </p:sp>
@@ -5539,25 +5795,43 @@
           <a:lstStyle/>
           <a:p>
             <a:r>
-              <a:rPr kumimoji="1" lang="ja-JP" altLang="en-US" dirty="0" smtClean="0"/>
+              <a:rPr kumimoji="1" lang="ja-JP" altLang="en-US" baseline="0" dirty="0" smtClean="0">
+                <a:latin typeface="ＭＳ ゴシック" panose="020B0609070205080204" pitchFamily="49" charset="-128"/>
+                <a:ea typeface="ＭＳ ゴシック" panose="020B0609070205080204" pitchFamily="49" charset="-128"/>
+              </a:rPr>
               <a:t>発行に関する期間は最短</a:t>
             </a:r>
             <a:r>
-              <a:rPr kumimoji="1" lang="en-US" altLang="ja-JP" dirty="0" smtClean="0"/>
+              <a:rPr kumimoji="1" lang="en-US" altLang="ja-JP" baseline="0" dirty="0" smtClean="0">
+                <a:latin typeface="ＭＳ ゴシック" panose="020B0609070205080204" pitchFamily="49" charset="-128"/>
+                <a:ea typeface="ＭＳ ゴシック" panose="020B0609070205080204" pitchFamily="49" charset="-128"/>
+              </a:rPr>
               <a:t>1</a:t>
             </a:r>
             <a:r>
-              <a:rPr kumimoji="1" lang="ja-JP" altLang="en-US" dirty="0" smtClean="0"/>
+              <a:rPr kumimoji="1" lang="ja-JP" altLang="en-US" baseline="0" dirty="0" smtClean="0">
+                <a:latin typeface="ＭＳ ゴシック" panose="020B0609070205080204" pitchFamily="49" charset="-128"/>
+                <a:ea typeface="ＭＳ ゴシック" panose="020B0609070205080204" pitchFamily="49" charset="-128"/>
+              </a:rPr>
               <a:t>週間</a:t>
             </a:r>
-            <a:endParaRPr kumimoji="1" lang="en-US" altLang="ja-JP" dirty="0" smtClean="0"/>
-          </a:p>
-          <a:p>
-            <a:r>
-              <a:rPr kumimoji="1" lang="ja-JP" altLang="en-US" dirty="0" smtClean="0"/>
+            <a:endParaRPr kumimoji="1" lang="en-US" altLang="ja-JP" baseline="0" dirty="0" smtClean="0">
+              <a:latin typeface="ＭＳ ゴシック" panose="020B0609070205080204" pitchFamily="49" charset="-128"/>
+              <a:ea typeface="ＭＳ ゴシック" panose="020B0609070205080204" pitchFamily="49" charset="-128"/>
+            </a:endParaRPr>
+          </a:p>
+          <a:p>
+            <a:r>
+              <a:rPr kumimoji="1" lang="ja-JP" altLang="en-US" baseline="0" dirty="0" smtClean="0">
+                <a:latin typeface="ＭＳ ゴシック" panose="020B0609070205080204" pitchFamily="49" charset="-128"/>
+                <a:ea typeface="ＭＳ ゴシック" panose="020B0609070205080204" pitchFamily="49" charset="-128"/>
+              </a:rPr>
               <a:t>学費が支払われている事</a:t>
             </a:r>
-            <a:endParaRPr kumimoji="1" lang="ja-JP" altLang="en-US" dirty="0"/>
+            <a:endParaRPr kumimoji="1" lang="ja-JP" altLang="en-US" baseline="0" dirty="0">
+              <a:latin typeface="ＭＳ ゴシック" panose="020B0609070205080204" pitchFamily="49" charset="-128"/>
+              <a:ea typeface="ＭＳ ゴシック" panose="020B0609070205080204" pitchFamily="49" charset="-128"/>
+            </a:endParaRPr>
           </a:p>
         </p:txBody>
       </p:sp>
@@ -5609,21 +5883,36 @@
           <a:lstStyle/>
           <a:p>
             <a:r>
-              <a:rPr kumimoji="1" lang="ja-JP" altLang="en-US" dirty="0" smtClean="0"/>
+              <a:rPr kumimoji="1" lang="ja-JP" altLang="en-US" baseline="0" dirty="0" smtClean="0">
+                <a:latin typeface="ＭＳ ゴシック" panose="020B0609070205080204" pitchFamily="49" charset="-128"/>
+                <a:ea typeface="ＭＳ ゴシック" panose="020B0609070205080204" pitchFamily="49" charset="-128"/>
+              </a:rPr>
               <a:t>書類の記入の仕方</a:t>
             </a:r>
             <a:r>
-              <a:rPr kumimoji="1" lang="en-US" altLang="ja-JP" dirty="0" smtClean="0"/>
+              <a:rPr kumimoji="1" lang="en-US" altLang="ja-JP" baseline="0" dirty="0" smtClean="0">
+                <a:latin typeface="ＭＳ ゴシック" panose="020B0609070205080204" pitchFamily="49" charset="-128"/>
+                <a:ea typeface="ＭＳ ゴシック" panose="020B0609070205080204" pitchFamily="49" charset="-128"/>
+              </a:rPr>
               <a:t/>
             </a:r>
             <a:br>
-              <a:rPr kumimoji="1" lang="en-US" altLang="ja-JP" dirty="0" smtClean="0"/>
+              <a:rPr kumimoji="1" lang="en-US" altLang="ja-JP" baseline="0" dirty="0" smtClean="0">
+                <a:latin typeface="ＭＳ ゴシック" panose="020B0609070205080204" pitchFamily="49" charset="-128"/>
+                <a:ea typeface="ＭＳ ゴシック" panose="020B0609070205080204" pitchFamily="49" charset="-128"/>
+              </a:rPr>
             </a:br>
             <a:r>
-              <a:rPr kumimoji="1" lang="ja-JP" altLang="en-US" dirty="0" smtClean="0"/>
+              <a:rPr kumimoji="1" lang="ja-JP" altLang="en-US" baseline="0" dirty="0" smtClean="0">
+                <a:latin typeface="ＭＳ ゴシック" panose="020B0609070205080204" pitchFamily="49" charset="-128"/>
+                <a:ea typeface="ＭＳ ゴシック" panose="020B0609070205080204" pitchFamily="49" charset="-128"/>
+              </a:rPr>
               <a:t>証明書の申込</a:t>
             </a:r>
-            <a:endParaRPr kumimoji="1" lang="ja-JP" altLang="en-US" dirty="0"/>
+            <a:endParaRPr kumimoji="1" lang="ja-JP" altLang="en-US" baseline="0" dirty="0">
+              <a:latin typeface="ＭＳ ゴシック" panose="020B0609070205080204" pitchFamily="49" charset="-128"/>
+              <a:ea typeface="ＭＳ ゴシック" panose="020B0609070205080204" pitchFamily="49" charset="-128"/>
+            </a:endParaRPr>
           </a:p>
         </p:txBody>
       </p:sp>
@@ -5694,21 +5983,36 @@
           <a:lstStyle/>
           <a:p>
             <a:r>
-              <a:rPr kumimoji="1" lang="ja-JP" altLang="en-US" dirty="0" smtClean="0"/>
+              <a:rPr kumimoji="1" lang="ja-JP" altLang="en-US" baseline="0" dirty="0" smtClean="0">
+                <a:latin typeface="ＭＳ ゴシック" panose="020B0609070205080204" pitchFamily="49" charset="-128"/>
+                <a:ea typeface="ＭＳ ゴシック" panose="020B0609070205080204" pitchFamily="49" charset="-128"/>
+              </a:rPr>
               <a:t>書類の記入の仕方</a:t>
             </a:r>
             <a:r>
-              <a:rPr kumimoji="1" lang="en-US" altLang="ja-JP" dirty="0" smtClean="0"/>
+              <a:rPr kumimoji="1" lang="en-US" altLang="ja-JP" baseline="0" dirty="0" smtClean="0">
+                <a:latin typeface="ＭＳ ゴシック" panose="020B0609070205080204" pitchFamily="49" charset="-128"/>
+                <a:ea typeface="ＭＳ ゴシック" panose="020B0609070205080204" pitchFamily="49" charset="-128"/>
+              </a:rPr>
               <a:t/>
             </a:r>
             <a:br>
-              <a:rPr kumimoji="1" lang="en-US" altLang="ja-JP" dirty="0" smtClean="0"/>
+              <a:rPr kumimoji="1" lang="en-US" altLang="ja-JP" baseline="0" dirty="0" smtClean="0">
+                <a:latin typeface="ＭＳ ゴシック" panose="020B0609070205080204" pitchFamily="49" charset="-128"/>
+                <a:ea typeface="ＭＳ ゴシック" panose="020B0609070205080204" pitchFamily="49" charset="-128"/>
+              </a:rPr>
             </a:br>
             <a:r>
-              <a:rPr kumimoji="1" lang="ja-JP" altLang="en-US" dirty="0" smtClean="0"/>
+              <a:rPr kumimoji="1" lang="ja-JP" altLang="en-US" baseline="0" dirty="0" smtClean="0">
+                <a:latin typeface="ＭＳ ゴシック" panose="020B0609070205080204" pitchFamily="49" charset="-128"/>
+                <a:ea typeface="ＭＳ ゴシック" panose="020B0609070205080204" pitchFamily="49" charset="-128"/>
+              </a:rPr>
               <a:t>就職申込票</a:t>
             </a:r>
-            <a:endParaRPr kumimoji="1" lang="ja-JP" altLang="en-US" dirty="0"/>
+            <a:endParaRPr kumimoji="1" lang="ja-JP" altLang="en-US" baseline="0" dirty="0">
+              <a:latin typeface="ＭＳ ゴシック" panose="020B0609070205080204" pitchFamily="49" charset="-128"/>
+              <a:ea typeface="ＭＳ ゴシック" panose="020B0609070205080204" pitchFamily="49" charset="-128"/>
+            </a:endParaRPr>
           </a:p>
         </p:txBody>
       </p:sp>
@@ -5779,21 +6083,36 @@
           <a:lstStyle/>
           <a:p>
             <a:r>
-              <a:rPr kumimoji="1" lang="ja-JP" altLang="en-US" dirty="0" smtClean="0"/>
+              <a:rPr kumimoji="1" lang="ja-JP" altLang="en-US" baseline="0" dirty="0" smtClean="0">
+                <a:latin typeface="ＭＳ ゴシック" panose="020B0609070205080204" pitchFamily="49" charset="-128"/>
+                <a:ea typeface="ＭＳ ゴシック" panose="020B0609070205080204" pitchFamily="49" charset="-128"/>
+              </a:rPr>
               <a:t>書類の記入の仕方</a:t>
             </a:r>
             <a:r>
-              <a:rPr kumimoji="1" lang="en-US" altLang="ja-JP" dirty="0" smtClean="0"/>
+              <a:rPr kumimoji="1" lang="en-US" altLang="ja-JP" baseline="0" dirty="0" smtClean="0">
+                <a:latin typeface="ＭＳ ゴシック" panose="020B0609070205080204" pitchFamily="49" charset="-128"/>
+                <a:ea typeface="ＭＳ ゴシック" panose="020B0609070205080204" pitchFamily="49" charset="-128"/>
+              </a:rPr>
               <a:t/>
             </a:r>
             <a:br>
-              <a:rPr kumimoji="1" lang="en-US" altLang="ja-JP" dirty="0" smtClean="0"/>
+              <a:rPr kumimoji="1" lang="en-US" altLang="ja-JP" baseline="0" dirty="0" smtClean="0">
+                <a:latin typeface="ＭＳ ゴシック" panose="020B0609070205080204" pitchFamily="49" charset="-128"/>
+                <a:ea typeface="ＭＳ ゴシック" panose="020B0609070205080204" pitchFamily="49" charset="-128"/>
+              </a:rPr>
             </a:br>
             <a:r>
-              <a:rPr kumimoji="1" lang="ja-JP" altLang="en-US" dirty="0" smtClean="0"/>
+              <a:rPr kumimoji="1" lang="ja-JP" altLang="en-US" baseline="0" dirty="0" smtClean="0">
+                <a:latin typeface="ＭＳ ゴシック" panose="020B0609070205080204" pitchFamily="49" charset="-128"/>
+                <a:ea typeface="ＭＳ ゴシック" panose="020B0609070205080204" pitchFamily="49" charset="-128"/>
+              </a:rPr>
               <a:t>履歴書の記入について</a:t>
             </a:r>
-            <a:endParaRPr kumimoji="1" lang="ja-JP" altLang="en-US" dirty="0"/>
+            <a:endParaRPr kumimoji="1" lang="ja-JP" altLang="en-US" baseline="0" dirty="0">
+              <a:latin typeface="ＭＳ ゴシック" panose="020B0609070205080204" pitchFamily="49" charset="-128"/>
+              <a:ea typeface="ＭＳ ゴシック" panose="020B0609070205080204" pitchFamily="49" charset="-128"/>
+            </a:endParaRPr>
           </a:p>
         </p:txBody>
       </p:sp>
@@ -5864,21 +6183,36 @@
           <a:lstStyle/>
           <a:p>
             <a:r>
-              <a:rPr kumimoji="1" lang="ja-JP" altLang="en-US" dirty="0" smtClean="0"/>
+              <a:rPr kumimoji="1" lang="ja-JP" altLang="en-US" baseline="0" dirty="0" smtClean="0">
+                <a:latin typeface="ＭＳ ゴシック" panose="020B0609070205080204" pitchFamily="49" charset="-128"/>
+                <a:ea typeface="ＭＳ ゴシック" panose="020B0609070205080204" pitchFamily="49" charset="-128"/>
+              </a:rPr>
               <a:t>就職の身だしなみ</a:t>
             </a:r>
             <a:r>
-              <a:rPr kumimoji="1" lang="en-US" altLang="ja-JP" dirty="0" smtClean="0"/>
+              <a:rPr kumimoji="1" lang="en-US" altLang="ja-JP" baseline="0" dirty="0" smtClean="0">
+                <a:latin typeface="ＭＳ ゴシック" panose="020B0609070205080204" pitchFamily="49" charset="-128"/>
+                <a:ea typeface="ＭＳ ゴシック" panose="020B0609070205080204" pitchFamily="49" charset="-128"/>
+              </a:rPr>
               <a:t/>
             </a:r>
             <a:br>
-              <a:rPr kumimoji="1" lang="en-US" altLang="ja-JP" dirty="0" smtClean="0"/>
+              <a:rPr kumimoji="1" lang="en-US" altLang="ja-JP" baseline="0" dirty="0" smtClean="0">
+                <a:latin typeface="ＭＳ ゴシック" panose="020B0609070205080204" pitchFamily="49" charset="-128"/>
+                <a:ea typeface="ＭＳ ゴシック" panose="020B0609070205080204" pitchFamily="49" charset="-128"/>
+              </a:rPr>
             </a:br>
             <a:r>
-              <a:rPr kumimoji="1" lang="ja-JP" altLang="en-US" dirty="0" smtClean="0"/>
+              <a:rPr kumimoji="1" lang="ja-JP" altLang="en-US" baseline="0" dirty="0" smtClean="0">
+                <a:latin typeface="ＭＳ ゴシック" panose="020B0609070205080204" pitchFamily="49" charset="-128"/>
+                <a:ea typeface="ＭＳ ゴシック" panose="020B0609070205080204" pitchFamily="49" charset="-128"/>
+              </a:rPr>
               <a:t>服装・持ち物について</a:t>
             </a:r>
-            <a:endParaRPr kumimoji="1" lang="ja-JP" altLang="en-US" dirty="0"/>
+            <a:endParaRPr kumimoji="1" lang="ja-JP" altLang="en-US" baseline="0" dirty="0">
+              <a:latin typeface="ＭＳ ゴシック" panose="020B0609070205080204" pitchFamily="49" charset="-128"/>
+              <a:ea typeface="ＭＳ ゴシック" panose="020B0609070205080204" pitchFamily="49" charset="-128"/>
+            </a:endParaRPr>
           </a:p>
         </p:txBody>
       </p:sp>
@@ -5947,10 +6281,16 @@
           <a:lstStyle/>
           <a:p>
             <a:r>
-              <a:rPr kumimoji="1" lang="ja-JP" altLang="en-US" dirty="0" smtClean="0"/>
+              <a:rPr kumimoji="1" lang="ja-JP" altLang="en-US" baseline="0" dirty="0" smtClean="0">
+                <a:latin typeface="ＭＳ ゴシック" panose="020B0609070205080204" pitchFamily="49" charset="-128"/>
+                <a:ea typeface="ＭＳ ゴシック" panose="020B0609070205080204" pitchFamily="49" charset="-128"/>
+              </a:rPr>
               <a:t>就職指導週間スケジュール</a:t>
             </a:r>
-            <a:endParaRPr kumimoji="1" lang="ja-JP" altLang="en-US" dirty="0"/>
+            <a:endParaRPr kumimoji="1" lang="ja-JP" altLang="en-US" baseline="0" dirty="0">
+              <a:latin typeface="ＭＳ ゴシック" panose="020B0609070205080204" pitchFamily="49" charset="-128"/>
+              <a:ea typeface="ＭＳ ゴシック" panose="020B0609070205080204" pitchFamily="49" charset="-128"/>
+            </a:endParaRPr>
           </a:p>
         </p:txBody>
       </p:sp>
@@ -6304,14 +6644,30 @@
           <a:lstStyle/>
           <a:p>
             <a:r>
-              <a:rPr kumimoji="1" lang="en-US" altLang="ja-JP" dirty="0" smtClean="0"/>
+              <a:rPr lang="en-US" altLang="ja-JP" baseline="0" dirty="0" smtClean="0">
+                <a:latin typeface="ＭＳ ゴシック" panose="020B0609070205080204" pitchFamily="49" charset="-128"/>
+                <a:ea typeface="ＭＳ ゴシック" panose="020B0609070205080204" pitchFamily="49" charset="-128"/>
+              </a:rPr>
               <a:t>31</a:t>
             </a:r>
             <a:r>
-              <a:rPr kumimoji="1" lang="ja-JP" altLang="en-US" dirty="0" smtClean="0"/>
-              <a:t>日はスーツ着用にて出校</a:t>
-            </a:r>
-            <a:endParaRPr kumimoji="1" lang="ja-JP" altLang="en-US" dirty="0"/>
+              <a:rPr kumimoji="1" lang="ja-JP" altLang="en-US" baseline="0" dirty="0" smtClean="0">
+                <a:latin typeface="ＭＳ ゴシック" panose="020B0609070205080204" pitchFamily="49" charset="-128"/>
+                <a:ea typeface="ＭＳ ゴシック" panose="020B0609070205080204" pitchFamily="49" charset="-128"/>
+              </a:rPr>
+              <a:t>日</a:t>
+            </a:r>
+            <a:r>
+              <a:rPr kumimoji="1" lang="ja-JP" altLang="en-US" baseline="0" dirty="0" smtClean="0">
+                <a:latin typeface="ＭＳ ゴシック" panose="020B0609070205080204" pitchFamily="49" charset="-128"/>
+                <a:ea typeface="ＭＳ ゴシック" panose="020B0609070205080204" pitchFamily="49" charset="-128"/>
+              </a:rPr>
+              <a:t>はスーツ着用にて出校</a:t>
+            </a:r>
+            <a:endParaRPr kumimoji="1" lang="ja-JP" altLang="en-US" baseline="0" dirty="0">
+              <a:latin typeface="ＭＳ ゴシック" panose="020B0609070205080204" pitchFamily="49" charset="-128"/>
+              <a:ea typeface="ＭＳ ゴシック" panose="020B0609070205080204" pitchFamily="49" charset="-128"/>
+            </a:endParaRPr>
           </a:p>
         </p:txBody>
       </p:sp>
@@ -6325,6 +6681,13 @@
   <p:clrMapOvr>
     <a:masterClrMapping/>
   </p:clrMapOvr>
+  <p:timing>
+    <p:tnLst>
+      <p:par>
+        <p:cTn id="1" dur="indefinite" restart="never" nodeType="tmRoot"/>
+      </p:par>
+    </p:tnLst>
+  </p:timing>
 </p:sld>
 </file>
 
@@ -6363,21 +6726,36 @@
           <a:lstStyle/>
           <a:p>
             <a:r>
-              <a:rPr kumimoji="1" lang="ja-JP" altLang="en-US" dirty="0" smtClean="0"/>
+              <a:rPr kumimoji="1" lang="ja-JP" altLang="en-US" baseline="0" dirty="0" smtClean="0">
+                <a:latin typeface="ＭＳ ゴシック" panose="020B0609070205080204" pitchFamily="49" charset="-128"/>
+                <a:ea typeface="ＭＳ ゴシック" panose="020B0609070205080204" pitchFamily="49" charset="-128"/>
+              </a:rPr>
               <a:t>就職の身だしなみ</a:t>
             </a:r>
             <a:r>
-              <a:rPr kumimoji="1" lang="en-US" altLang="ja-JP" dirty="0" smtClean="0"/>
+              <a:rPr kumimoji="1" lang="en-US" altLang="ja-JP" baseline="0" dirty="0" smtClean="0">
+                <a:latin typeface="ＭＳ ゴシック" panose="020B0609070205080204" pitchFamily="49" charset="-128"/>
+                <a:ea typeface="ＭＳ ゴシック" panose="020B0609070205080204" pitchFamily="49" charset="-128"/>
+              </a:rPr>
               <a:t/>
             </a:r>
             <a:br>
-              <a:rPr kumimoji="1" lang="en-US" altLang="ja-JP" dirty="0" smtClean="0"/>
+              <a:rPr kumimoji="1" lang="en-US" altLang="ja-JP" baseline="0" dirty="0" smtClean="0">
+                <a:latin typeface="ＭＳ ゴシック" panose="020B0609070205080204" pitchFamily="49" charset="-128"/>
+                <a:ea typeface="ＭＳ ゴシック" panose="020B0609070205080204" pitchFamily="49" charset="-128"/>
+              </a:rPr>
             </a:br>
             <a:r>
-              <a:rPr kumimoji="1" lang="ja-JP" altLang="en-US" dirty="0" smtClean="0"/>
+              <a:rPr kumimoji="1" lang="ja-JP" altLang="en-US" baseline="0" dirty="0" smtClean="0">
+                <a:latin typeface="ＭＳ ゴシック" panose="020B0609070205080204" pitchFamily="49" charset="-128"/>
+                <a:ea typeface="ＭＳ ゴシック" panose="020B0609070205080204" pitchFamily="49" charset="-128"/>
+              </a:rPr>
               <a:t>男子の服装</a:t>
             </a:r>
-            <a:endParaRPr kumimoji="1" lang="ja-JP" altLang="en-US" dirty="0"/>
+            <a:endParaRPr kumimoji="1" lang="ja-JP" altLang="en-US" baseline="0" dirty="0">
+              <a:latin typeface="ＭＳ ゴシック" panose="020B0609070205080204" pitchFamily="49" charset="-128"/>
+              <a:ea typeface="ＭＳ ゴシック" panose="020B0609070205080204" pitchFamily="49" charset="-128"/>
+            </a:endParaRPr>
           </a:p>
         </p:txBody>
       </p:sp>
@@ -6451,21 +6829,36 @@
           <a:lstStyle/>
           <a:p>
             <a:r>
-              <a:rPr kumimoji="1" lang="ja-JP" altLang="en-US" dirty="0" smtClean="0"/>
+              <a:rPr kumimoji="1" lang="ja-JP" altLang="en-US" baseline="0" dirty="0" smtClean="0">
+                <a:latin typeface="ＭＳ ゴシック" panose="020B0609070205080204" pitchFamily="49" charset="-128"/>
+                <a:ea typeface="ＭＳ ゴシック" panose="020B0609070205080204" pitchFamily="49" charset="-128"/>
+              </a:rPr>
               <a:t>就職の身だしなみ</a:t>
             </a:r>
             <a:r>
-              <a:rPr kumimoji="1" lang="en-US" altLang="ja-JP" dirty="0" smtClean="0"/>
+              <a:rPr kumimoji="1" lang="en-US" altLang="ja-JP" baseline="0" dirty="0" smtClean="0">
+                <a:latin typeface="ＭＳ ゴシック" panose="020B0609070205080204" pitchFamily="49" charset="-128"/>
+                <a:ea typeface="ＭＳ ゴシック" panose="020B0609070205080204" pitchFamily="49" charset="-128"/>
+              </a:rPr>
               <a:t/>
             </a:r>
             <a:br>
-              <a:rPr kumimoji="1" lang="en-US" altLang="ja-JP" dirty="0" smtClean="0"/>
+              <a:rPr kumimoji="1" lang="en-US" altLang="ja-JP" baseline="0" dirty="0" smtClean="0">
+                <a:latin typeface="ＭＳ ゴシック" panose="020B0609070205080204" pitchFamily="49" charset="-128"/>
+                <a:ea typeface="ＭＳ ゴシック" panose="020B0609070205080204" pitchFamily="49" charset="-128"/>
+              </a:rPr>
             </a:br>
             <a:r>
-              <a:rPr kumimoji="1" lang="ja-JP" altLang="en-US" dirty="0" smtClean="0"/>
+              <a:rPr kumimoji="1" lang="ja-JP" altLang="en-US" baseline="0" dirty="0" smtClean="0">
+                <a:latin typeface="ＭＳ ゴシック" panose="020B0609070205080204" pitchFamily="49" charset="-128"/>
+                <a:ea typeface="ＭＳ ゴシック" panose="020B0609070205080204" pitchFamily="49" charset="-128"/>
+              </a:rPr>
               <a:t>女子の服装</a:t>
             </a:r>
-            <a:endParaRPr kumimoji="1" lang="ja-JP" altLang="en-US" dirty="0"/>
+            <a:endParaRPr kumimoji="1" lang="ja-JP" altLang="en-US" baseline="0" dirty="0">
+              <a:latin typeface="ＭＳ ゴシック" panose="020B0609070205080204" pitchFamily="49" charset="-128"/>
+              <a:ea typeface="ＭＳ ゴシック" panose="020B0609070205080204" pitchFamily="49" charset="-128"/>
+            </a:endParaRPr>
           </a:p>
         </p:txBody>
       </p:sp>
@@ -6534,10 +6927,16 @@
           <a:lstStyle/>
           <a:p>
             <a:r>
-              <a:rPr kumimoji="1" lang="ja-JP" altLang="en-US" dirty="0" smtClean="0"/>
+              <a:rPr kumimoji="1" lang="ja-JP" altLang="en-US" baseline="0" dirty="0" smtClean="0">
+                <a:latin typeface="ＭＳ ゴシック" panose="020B0609070205080204" pitchFamily="49" charset="-128"/>
+                <a:ea typeface="ＭＳ ゴシック" panose="020B0609070205080204" pitchFamily="49" charset="-128"/>
+              </a:rPr>
               <a:t>就職の身だしなみ</a:t>
             </a:r>
-            <a:endParaRPr kumimoji="1" lang="ja-JP" altLang="en-US" dirty="0"/>
+            <a:endParaRPr kumimoji="1" lang="ja-JP" altLang="en-US" baseline="0" dirty="0">
+              <a:latin typeface="ＭＳ ゴシック" panose="020B0609070205080204" pitchFamily="49" charset="-128"/>
+              <a:ea typeface="ＭＳ ゴシック" panose="020B0609070205080204" pitchFamily="49" charset="-128"/>
+            </a:endParaRPr>
           </a:p>
         </p:txBody>
       </p:sp>
@@ -6606,10 +7005,16 @@
           <a:lstStyle/>
           <a:p>
             <a:r>
-              <a:rPr kumimoji="1" lang="ja-JP" altLang="en-US" dirty="0" smtClean="0"/>
+              <a:rPr kumimoji="1" lang="ja-JP" altLang="en-US" baseline="0" dirty="0" smtClean="0">
+                <a:latin typeface="ＭＳ ゴシック" panose="020B0609070205080204" pitchFamily="49" charset="-128"/>
+                <a:ea typeface="ＭＳ ゴシック" panose="020B0609070205080204" pitchFamily="49" charset="-128"/>
+              </a:rPr>
               <a:t>特定活動ビザ</a:t>
             </a:r>
-            <a:endParaRPr kumimoji="1" lang="ja-JP" altLang="en-US" dirty="0"/>
+            <a:endParaRPr kumimoji="1" lang="ja-JP" altLang="en-US" baseline="0" dirty="0">
+              <a:latin typeface="ＭＳ ゴシック" panose="020B0609070205080204" pitchFamily="49" charset="-128"/>
+              <a:ea typeface="ＭＳ ゴシック" panose="020B0609070205080204" pitchFamily="49" charset="-128"/>
+            </a:endParaRPr>
           </a:p>
         </p:txBody>
       </p:sp>
@@ -6677,7 +7082,10 @@
           <a:bodyPr/>
           <a:lstStyle/>
           <a:p>
-            <a:endParaRPr kumimoji="1" lang="ja-JP" altLang="en-US" dirty="0"/>
+            <a:endParaRPr kumimoji="1" lang="ja-JP" altLang="en-US" baseline="0" dirty="0">
+              <a:latin typeface="ＭＳ ゴシック" panose="020B0609070205080204" pitchFamily="49" charset="-128"/>
+              <a:ea typeface="ＭＳ ゴシック" panose="020B0609070205080204" pitchFamily="49" charset="-128"/>
+            </a:endParaRPr>
           </a:p>
         </p:txBody>
       </p:sp>
@@ -6746,10 +7154,16 @@
           <a:lstStyle/>
           <a:p>
             <a:r>
-              <a:rPr kumimoji="1" lang="ja-JP" altLang="en-US" dirty="0" smtClean="0"/>
+              <a:rPr kumimoji="1" lang="ja-JP" altLang="en-US" baseline="0" dirty="0" smtClean="0">
+                <a:latin typeface="ＭＳ ゴシック" panose="020B0609070205080204" pitchFamily="49" charset="-128"/>
+                <a:ea typeface="ＭＳ ゴシック" panose="020B0609070205080204" pitchFamily="49" charset="-128"/>
+              </a:rPr>
               <a:t>進学について</a:t>
             </a:r>
-            <a:endParaRPr kumimoji="1" lang="ja-JP" altLang="en-US" dirty="0"/>
+            <a:endParaRPr kumimoji="1" lang="ja-JP" altLang="en-US" baseline="0" dirty="0">
+              <a:latin typeface="ＭＳ ゴシック" panose="020B0609070205080204" pitchFamily="49" charset="-128"/>
+              <a:ea typeface="ＭＳ ゴシック" panose="020B0609070205080204" pitchFamily="49" charset="-128"/>
+            </a:endParaRPr>
           </a:p>
         </p:txBody>
       </p:sp>
@@ -6818,10 +7232,16 @@
           <a:lstStyle/>
           <a:p>
             <a:r>
-              <a:rPr kumimoji="1" lang="ja-JP" altLang="en-US" dirty="0" smtClean="0"/>
+              <a:rPr kumimoji="1" lang="ja-JP" altLang="en-US" baseline="0" dirty="0" smtClean="0">
+                <a:latin typeface="ＭＳ ゴシック" panose="020B0609070205080204" pitchFamily="49" charset="-128"/>
+                <a:ea typeface="ＭＳ ゴシック" panose="020B0609070205080204" pitchFamily="49" charset="-128"/>
+              </a:rPr>
               <a:t>受験上有利になる資格</a:t>
             </a:r>
-            <a:endParaRPr kumimoji="1" lang="ja-JP" altLang="en-US" dirty="0"/>
+            <a:endParaRPr kumimoji="1" lang="ja-JP" altLang="en-US" baseline="0" dirty="0">
+              <a:latin typeface="ＭＳ ゴシック" panose="020B0609070205080204" pitchFamily="49" charset="-128"/>
+              <a:ea typeface="ＭＳ ゴシック" panose="020B0609070205080204" pitchFamily="49" charset="-128"/>
+            </a:endParaRPr>
           </a:p>
         </p:txBody>
       </p:sp>
@@ -6890,10 +7310,16 @@
           <a:lstStyle/>
           <a:p>
             <a:r>
-              <a:rPr kumimoji="1" lang="ja-JP" altLang="en-US" dirty="0" smtClean="0"/>
+              <a:rPr kumimoji="1" lang="ja-JP" altLang="en-US" baseline="0" dirty="0" smtClean="0">
+                <a:latin typeface="ＭＳ ゴシック" panose="020B0609070205080204" pitchFamily="49" charset="-128"/>
+                <a:ea typeface="ＭＳ ゴシック" panose="020B0609070205080204" pitchFamily="49" charset="-128"/>
+              </a:rPr>
               <a:t>担任推薦について</a:t>
             </a:r>
-            <a:endParaRPr kumimoji="1" lang="ja-JP" altLang="en-US" dirty="0"/>
+            <a:endParaRPr kumimoji="1" lang="ja-JP" altLang="en-US" baseline="0" dirty="0">
+              <a:latin typeface="ＭＳ ゴシック" panose="020B0609070205080204" pitchFamily="49" charset="-128"/>
+              <a:ea typeface="ＭＳ ゴシック" panose="020B0609070205080204" pitchFamily="49" charset="-128"/>
+            </a:endParaRPr>
           </a:p>
         </p:txBody>
       </p:sp>
@@ -6962,10 +7388,16 @@
           <a:lstStyle/>
           <a:p>
             <a:r>
-              <a:rPr kumimoji="1" lang="ja-JP" altLang="en-US" dirty="0" smtClean="0"/>
+              <a:rPr kumimoji="1" lang="ja-JP" altLang="en-US" baseline="0" dirty="0" smtClean="0">
+                <a:latin typeface="ＭＳ ゴシック" panose="020B0609070205080204" pitchFamily="49" charset="-128"/>
+                <a:ea typeface="ＭＳ ゴシック" panose="020B0609070205080204" pitchFamily="49" charset="-128"/>
+              </a:rPr>
               <a:t>就職指導週間のスケジュール</a:t>
             </a:r>
-            <a:endParaRPr kumimoji="1" lang="ja-JP" altLang="en-US" dirty="0"/>
+            <a:endParaRPr kumimoji="1" lang="ja-JP" altLang="en-US" baseline="0" dirty="0">
+              <a:latin typeface="ＭＳ ゴシック" panose="020B0609070205080204" pitchFamily="49" charset="-128"/>
+              <a:ea typeface="ＭＳ ゴシック" panose="020B0609070205080204" pitchFamily="49" charset="-128"/>
+            </a:endParaRPr>
           </a:p>
         </p:txBody>
       </p:sp>
@@ -7170,6 +7602,13 @@
   <p:clrMapOvr>
     <a:masterClrMapping/>
   </p:clrMapOvr>
+  <p:timing>
+    <p:tnLst>
+      <p:par>
+        <p:cTn id="1" dur="indefinite" restart="never" nodeType="tmRoot"/>
+      </p:par>
+    </p:tnLst>
+  </p:timing>
 </p:sld>
 </file>
 
@@ -7208,10 +7647,16 @@
           <a:lstStyle/>
           <a:p>
             <a:r>
-              <a:rPr kumimoji="1" lang="ja-JP" altLang="en-US" dirty="0" smtClean="0"/>
+              <a:rPr kumimoji="1" lang="ja-JP" altLang="en-US" baseline="0" dirty="0" smtClean="0">
+                <a:latin typeface="ＭＳ ゴシック" panose="020B0609070205080204" pitchFamily="49" charset="-128"/>
+                <a:ea typeface="ＭＳ ゴシック" panose="020B0609070205080204" pitchFamily="49" charset="-128"/>
+              </a:rPr>
               <a:t>就職指導週間の目的</a:t>
             </a:r>
-            <a:endParaRPr kumimoji="1" lang="ja-JP" altLang="en-US" dirty="0"/>
+            <a:endParaRPr kumimoji="1" lang="ja-JP" altLang="en-US" baseline="0" dirty="0">
+              <a:latin typeface="ＭＳ ゴシック" panose="020B0609070205080204" pitchFamily="49" charset="-128"/>
+              <a:ea typeface="ＭＳ ゴシック" panose="020B0609070205080204" pitchFamily="49" charset="-128"/>
+            </a:endParaRPr>
           </a:p>
         </p:txBody>
       </p:sp>
@@ -7231,56 +7676,98 @@
           <a:lstStyle/>
           <a:p>
             <a:r>
-              <a:rPr kumimoji="1" lang="ja-JP" altLang="en-US" dirty="0" smtClean="0"/>
+              <a:rPr kumimoji="1" lang="ja-JP" altLang="en-US" baseline="0" dirty="0" smtClean="0">
+                <a:latin typeface="ＭＳ ゴシック" panose="020B0609070205080204" pitchFamily="49" charset="-128"/>
+                <a:ea typeface="ＭＳ ゴシック" panose="020B0609070205080204" pitchFamily="49" charset="-128"/>
+              </a:rPr>
               <a:t>就職・進学ともに、意識を変える</a:t>
             </a:r>
-            <a:endParaRPr kumimoji="1" lang="en-US" altLang="ja-JP" dirty="0" smtClean="0"/>
+            <a:endParaRPr kumimoji="1" lang="en-US" altLang="ja-JP" baseline="0" dirty="0" smtClean="0">
+              <a:latin typeface="ＭＳ ゴシック" panose="020B0609070205080204" pitchFamily="49" charset="-128"/>
+              <a:ea typeface="ＭＳ ゴシック" panose="020B0609070205080204" pitchFamily="49" charset="-128"/>
+            </a:endParaRPr>
           </a:p>
           <a:p>
             <a:pPr lvl="1"/>
             <a:r>
-              <a:rPr lang="ja-JP" altLang="en-US" dirty="0"/>
+              <a:rPr lang="ja-JP" altLang="en-US" baseline="0" dirty="0">
+                <a:latin typeface="ＭＳ ゴシック" panose="020B0609070205080204" pitchFamily="49" charset="-128"/>
+                <a:ea typeface="ＭＳ ゴシック" panose="020B0609070205080204" pitchFamily="49" charset="-128"/>
+              </a:rPr>
               <a:t>就職</a:t>
             </a:r>
             <a:r>
-              <a:rPr lang="ja-JP" altLang="en-US" dirty="0" smtClean="0"/>
+              <a:rPr lang="ja-JP" altLang="en-US" baseline="0" dirty="0" smtClean="0">
+                <a:latin typeface="ＭＳ ゴシック" panose="020B0609070205080204" pitchFamily="49" charset="-128"/>
+                <a:ea typeface="ＭＳ ゴシック" panose="020B0609070205080204" pitchFamily="49" charset="-128"/>
+              </a:rPr>
               <a:t>は、「相手があなたを選ぶ」</a:t>
             </a:r>
-            <a:endParaRPr kumimoji="1" lang="en-US" altLang="ja-JP" dirty="0" smtClean="0"/>
-          </a:p>
-          <a:p>
-            <a:r>
-              <a:rPr kumimoji="1" lang="ja-JP" altLang="en-US" dirty="0" smtClean="0"/>
+            <a:endParaRPr kumimoji="1" lang="en-US" altLang="ja-JP" baseline="0" dirty="0" smtClean="0">
+              <a:latin typeface="ＭＳ ゴシック" panose="020B0609070205080204" pitchFamily="49" charset="-128"/>
+              <a:ea typeface="ＭＳ ゴシック" panose="020B0609070205080204" pitchFamily="49" charset="-128"/>
+            </a:endParaRPr>
+          </a:p>
+          <a:p>
+            <a:r>
+              <a:rPr kumimoji="1" lang="ja-JP" altLang="en-US" baseline="0" dirty="0" smtClean="0">
+                <a:latin typeface="ＭＳ ゴシック" panose="020B0609070205080204" pitchFamily="49" charset="-128"/>
+                <a:ea typeface="ＭＳ ゴシック" panose="020B0609070205080204" pitchFamily="49" charset="-128"/>
+              </a:rPr>
               <a:t>就職に必要な知識を持つ</a:t>
             </a:r>
-            <a:endParaRPr kumimoji="1" lang="en-US" altLang="ja-JP" dirty="0" smtClean="0"/>
+            <a:endParaRPr kumimoji="1" lang="en-US" altLang="ja-JP" baseline="0" dirty="0" smtClean="0">
+              <a:latin typeface="ＭＳ ゴシック" panose="020B0609070205080204" pitchFamily="49" charset="-128"/>
+              <a:ea typeface="ＭＳ ゴシック" panose="020B0609070205080204" pitchFamily="49" charset="-128"/>
+            </a:endParaRPr>
           </a:p>
           <a:p>
             <a:pPr lvl="1"/>
             <a:r>
-              <a:rPr kumimoji="1" lang="ja-JP" altLang="en-US" dirty="0" smtClean="0"/>
+              <a:rPr kumimoji="1" lang="ja-JP" altLang="en-US" baseline="0" dirty="0" smtClean="0">
+                <a:latin typeface="ＭＳ ゴシック" panose="020B0609070205080204" pitchFamily="49" charset="-128"/>
+                <a:ea typeface="ＭＳ ゴシック" panose="020B0609070205080204" pitchFamily="49" charset="-128"/>
+              </a:rPr>
               <a:t>就職は日本の基準（自分の国の基準ではない）</a:t>
             </a:r>
-            <a:endParaRPr kumimoji="1" lang="en-US" altLang="ja-JP" dirty="0" smtClean="0"/>
-          </a:p>
-          <a:p>
-            <a:r>
-              <a:rPr kumimoji="1" lang="ja-JP" altLang="en-US" dirty="0" smtClean="0"/>
+            <a:endParaRPr kumimoji="1" lang="en-US" altLang="ja-JP" baseline="0" dirty="0" smtClean="0">
+              <a:latin typeface="ＭＳ ゴシック" panose="020B0609070205080204" pitchFamily="49" charset="-128"/>
+              <a:ea typeface="ＭＳ ゴシック" panose="020B0609070205080204" pitchFamily="49" charset="-128"/>
+            </a:endParaRPr>
+          </a:p>
+          <a:p>
+            <a:r>
+              <a:rPr kumimoji="1" lang="ja-JP" altLang="en-US" baseline="0" dirty="0" smtClean="0">
+                <a:latin typeface="ＭＳ ゴシック" panose="020B0609070205080204" pitchFamily="49" charset="-128"/>
+                <a:ea typeface="ＭＳ ゴシック" panose="020B0609070205080204" pitchFamily="49" charset="-128"/>
+              </a:rPr>
               <a:t>書類作成の知識を学ぶ</a:t>
             </a:r>
-            <a:endParaRPr kumimoji="1" lang="en-US" altLang="ja-JP" dirty="0" smtClean="0"/>
+            <a:endParaRPr kumimoji="1" lang="en-US" altLang="ja-JP" baseline="0" dirty="0" smtClean="0">
+              <a:latin typeface="ＭＳ ゴシック" panose="020B0609070205080204" pitchFamily="49" charset="-128"/>
+              <a:ea typeface="ＭＳ ゴシック" panose="020B0609070205080204" pitchFamily="49" charset="-128"/>
+            </a:endParaRPr>
           </a:p>
           <a:p>
             <a:pPr lvl="1"/>
             <a:r>
-              <a:rPr lang="ja-JP" altLang="en-US" dirty="0"/>
+              <a:rPr lang="ja-JP" altLang="en-US" baseline="0" dirty="0">
+                <a:latin typeface="ＭＳ ゴシック" panose="020B0609070205080204" pitchFamily="49" charset="-128"/>
+                <a:ea typeface="ＭＳ ゴシック" panose="020B0609070205080204" pitchFamily="49" charset="-128"/>
+              </a:rPr>
               <a:t>提出する書類の不備は</a:t>
             </a:r>
             <a:r>
-              <a:rPr lang="ja-JP" altLang="en-US" dirty="0" smtClean="0"/>
+              <a:rPr lang="ja-JP" altLang="en-US" baseline="0" dirty="0" smtClean="0">
+                <a:latin typeface="ＭＳ ゴシック" panose="020B0609070205080204" pitchFamily="49" charset="-128"/>
+                <a:ea typeface="ＭＳ ゴシック" panose="020B0609070205080204" pitchFamily="49" charset="-128"/>
+              </a:rPr>
               <a:t>不合格</a:t>
             </a:r>
-            <a:endParaRPr lang="en-US" altLang="ja-JP" dirty="0" smtClean="0"/>
+            <a:endParaRPr lang="en-US" altLang="ja-JP" baseline="0" dirty="0" smtClean="0">
+              <a:latin typeface="ＭＳ ゴシック" panose="020B0609070205080204" pitchFamily="49" charset="-128"/>
+              <a:ea typeface="ＭＳ ゴシック" panose="020B0609070205080204" pitchFamily="49" charset="-128"/>
+            </a:endParaRPr>
           </a:p>
         </p:txBody>
       </p:sp>
@@ -7294,6 +7781,13 @@
   <p:clrMapOvr>
     <a:masterClrMapping/>
   </p:clrMapOvr>
+  <p:timing>
+    <p:tnLst>
+      <p:par>
+        <p:cTn id="1" dur="indefinite" restart="never" nodeType="tmRoot"/>
+      </p:par>
+    </p:tnLst>
+  </p:timing>
 </p:sld>
 </file>
 
@@ -7332,10 +7826,16 @@
           <a:lstStyle/>
           <a:p>
             <a:r>
-              <a:rPr kumimoji="1" lang="ja-JP" altLang="en-US" dirty="0" smtClean="0"/>
+              <a:rPr kumimoji="1" lang="ja-JP" altLang="en-US" baseline="0" dirty="0" smtClean="0">
+                <a:latin typeface="ＭＳ ゴシック" panose="020B0609070205080204" pitchFamily="49" charset="-128"/>
+                <a:ea typeface="ＭＳ ゴシック" panose="020B0609070205080204" pitchFamily="49" charset="-128"/>
+              </a:rPr>
               <a:t>就職指導週間の約束</a:t>
             </a:r>
-            <a:endParaRPr kumimoji="1" lang="ja-JP" altLang="en-US" dirty="0"/>
+            <a:endParaRPr kumimoji="1" lang="ja-JP" altLang="en-US" baseline="0" dirty="0">
+              <a:latin typeface="ＭＳ ゴシック" panose="020B0609070205080204" pitchFamily="49" charset="-128"/>
+              <a:ea typeface="ＭＳ ゴシック" panose="020B0609070205080204" pitchFamily="49" charset="-128"/>
+            </a:endParaRPr>
           </a:p>
         </p:txBody>
       </p:sp>
@@ -7357,54 +7857,96 @@
           <a:lstStyle/>
           <a:p>
             <a:r>
-              <a:rPr kumimoji="1" lang="ja-JP" altLang="en-US" dirty="0" smtClean="0"/>
+              <a:rPr kumimoji="1" lang="ja-JP" altLang="en-US" baseline="0" dirty="0" smtClean="0">
+                <a:latin typeface="ＭＳ ゴシック" panose="020B0609070205080204" pitchFamily="49" charset="-128"/>
+                <a:ea typeface="ＭＳ ゴシック" panose="020B0609070205080204" pitchFamily="49" charset="-128"/>
+              </a:rPr>
               <a:t>「あいさつ」をする。</a:t>
             </a:r>
-            <a:endParaRPr kumimoji="1" lang="en-US" altLang="ja-JP" dirty="0" smtClean="0"/>
-          </a:p>
-          <a:p>
-            <a:endParaRPr kumimoji="1" lang="en-US" altLang="ja-JP" dirty="0" smtClean="0"/>
-          </a:p>
-          <a:p>
-            <a:r>
-              <a:rPr lang="ja-JP" altLang="en-US" dirty="0" smtClean="0"/>
+            <a:endParaRPr kumimoji="1" lang="en-US" altLang="ja-JP" baseline="0" dirty="0" smtClean="0">
+              <a:latin typeface="ＭＳ ゴシック" panose="020B0609070205080204" pitchFamily="49" charset="-128"/>
+              <a:ea typeface="ＭＳ ゴシック" panose="020B0609070205080204" pitchFamily="49" charset="-128"/>
+            </a:endParaRPr>
+          </a:p>
+          <a:p>
+            <a:endParaRPr kumimoji="1" lang="en-US" altLang="ja-JP" baseline="0" dirty="0" smtClean="0">
+              <a:latin typeface="ＭＳ ゴシック" panose="020B0609070205080204" pitchFamily="49" charset="-128"/>
+              <a:ea typeface="ＭＳ ゴシック" panose="020B0609070205080204" pitchFamily="49" charset="-128"/>
+            </a:endParaRPr>
+          </a:p>
+          <a:p>
+            <a:r>
+              <a:rPr lang="ja-JP" altLang="en-US" baseline="0" dirty="0" smtClean="0">
+                <a:latin typeface="ＭＳ ゴシック" panose="020B0609070205080204" pitchFamily="49" charset="-128"/>
+                <a:ea typeface="ＭＳ ゴシック" panose="020B0609070205080204" pitchFamily="49" charset="-128"/>
+              </a:rPr>
               <a:t>「えがお」</a:t>
             </a:r>
-            <a:endParaRPr lang="en-US" altLang="ja-JP" dirty="0" smtClean="0"/>
+            <a:endParaRPr lang="en-US" altLang="ja-JP" baseline="0" dirty="0" smtClean="0">
+              <a:latin typeface="ＭＳ ゴシック" panose="020B0609070205080204" pitchFamily="49" charset="-128"/>
+              <a:ea typeface="ＭＳ ゴシック" panose="020B0609070205080204" pitchFamily="49" charset="-128"/>
+            </a:endParaRPr>
           </a:p>
           <a:p>
             <a:pPr lvl="1"/>
             <a:r>
-              <a:rPr lang="ja-JP" altLang="en-US" dirty="0" smtClean="0"/>
+              <a:rPr lang="ja-JP" altLang="en-US" baseline="0" dirty="0" smtClean="0">
+                <a:latin typeface="ＭＳ ゴシック" panose="020B0609070205080204" pitchFamily="49" charset="-128"/>
+                <a:ea typeface="ＭＳ ゴシック" panose="020B0609070205080204" pitchFamily="49" charset="-128"/>
+              </a:rPr>
               <a:t>はなしかけやすい人＝面接で有利</a:t>
             </a:r>
-            <a:endParaRPr lang="en-US" altLang="ja-JP" dirty="0"/>
-          </a:p>
-          <a:p>
-            <a:endParaRPr lang="en-US" altLang="ja-JP" dirty="0" smtClean="0"/>
-          </a:p>
-          <a:p>
-            <a:r>
-              <a:rPr lang="ja-JP" altLang="en-US" dirty="0" smtClean="0"/>
+            <a:endParaRPr lang="en-US" altLang="ja-JP" baseline="0" dirty="0">
+              <a:latin typeface="ＭＳ ゴシック" panose="020B0609070205080204" pitchFamily="49" charset="-128"/>
+              <a:ea typeface="ＭＳ ゴシック" panose="020B0609070205080204" pitchFamily="49" charset="-128"/>
+            </a:endParaRPr>
+          </a:p>
+          <a:p>
+            <a:endParaRPr lang="en-US" altLang="ja-JP" baseline="0" dirty="0" smtClean="0">
+              <a:latin typeface="ＭＳ ゴシック" panose="020B0609070205080204" pitchFamily="49" charset="-128"/>
+              <a:ea typeface="ＭＳ ゴシック" panose="020B0609070205080204" pitchFamily="49" charset="-128"/>
+            </a:endParaRPr>
+          </a:p>
+          <a:p>
+            <a:r>
+              <a:rPr lang="ja-JP" altLang="en-US" baseline="0" dirty="0" smtClean="0">
+                <a:latin typeface="ＭＳ ゴシック" panose="020B0609070205080204" pitchFamily="49" charset="-128"/>
+                <a:ea typeface="ＭＳ ゴシック" panose="020B0609070205080204" pitchFamily="49" charset="-128"/>
+              </a:rPr>
               <a:t>自己</a:t>
             </a:r>
             <a:r>
-              <a:rPr lang="ja-JP" altLang="en-US" dirty="0"/>
+              <a:rPr lang="ja-JP" altLang="en-US" baseline="0" dirty="0">
+                <a:latin typeface="ＭＳ ゴシック" panose="020B0609070205080204" pitchFamily="49" charset="-128"/>
+                <a:ea typeface="ＭＳ ゴシック" panose="020B0609070205080204" pitchFamily="49" charset="-128"/>
+              </a:rPr>
               <a:t>中心的な行動は</a:t>
             </a:r>
             <a:r>
-              <a:rPr lang="ja-JP" altLang="en-US" dirty="0" smtClean="0"/>
+              <a:rPr lang="ja-JP" altLang="en-US" baseline="0" dirty="0" smtClean="0">
+                <a:latin typeface="ＭＳ ゴシック" panose="020B0609070205080204" pitchFamily="49" charset="-128"/>
+                <a:ea typeface="ＭＳ ゴシック" panose="020B0609070205080204" pitchFamily="49" charset="-128"/>
+              </a:rPr>
               <a:t>慎む</a:t>
             </a:r>
-            <a:endParaRPr lang="en-US" altLang="ja-JP" dirty="0" smtClean="0"/>
+            <a:endParaRPr lang="en-US" altLang="ja-JP" baseline="0" dirty="0" smtClean="0">
+              <a:latin typeface="ＭＳ ゴシック" panose="020B0609070205080204" pitchFamily="49" charset="-128"/>
+              <a:ea typeface="ＭＳ ゴシック" panose="020B0609070205080204" pitchFamily="49" charset="-128"/>
+            </a:endParaRPr>
           </a:p>
           <a:p>
             <a:pPr lvl="1"/>
             <a:r>
-              <a:rPr lang="ja-JP" altLang="en-US" dirty="0" smtClean="0"/>
+              <a:rPr lang="ja-JP" altLang="en-US" baseline="0" dirty="0" smtClean="0">
+                <a:latin typeface="ＭＳ ゴシック" panose="020B0609070205080204" pitchFamily="49" charset="-128"/>
+                <a:ea typeface="ＭＳ ゴシック" panose="020B0609070205080204" pitchFamily="49" charset="-128"/>
+              </a:rPr>
               <a:t>面接で嫌われる人</a:t>
             </a:r>
-            <a:endParaRPr lang="en-US" altLang="ja-JP" dirty="0" smtClean="0"/>
+            <a:endParaRPr lang="en-US" altLang="ja-JP" baseline="0" dirty="0" smtClean="0">
+              <a:latin typeface="ＭＳ ゴシック" panose="020B0609070205080204" pitchFamily="49" charset="-128"/>
+              <a:ea typeface="ＭＳ ゴシック" panose="020B0609070205080204" pitchFamily="49" charset="-128"/>
+            </a:endParaRPr>
           </a:p>
         </p:txBody>
       </p:sp>
@@ -7456,10 +7998,16 @@
           <a:lstStyle/>
           <a:p>
             <a:r>
-              <a:rPr kumimoji="1" lang="ja-JP" altLang="en-US" dirty="0" smtClean="0"/>
+              <a:rPr kumimoji="1" lang="ja-JP" altLang="en-US" baseline="0" dirty="0" smtClean="0">
+                <a:latin typeface="ＭＳ ゴシック" panose="020B0609070205080204" pitchFamily="49" charset="-128"/>
+                <a:ea typeface="ＭＳ ゴシック" panose="020B0609070205080204" pitchFamily="49" charset="-128"/>
+              </a:rPr>
               <a:t>就職指導週間の約束（２）</a:t>
             </a:r>
-            <a:endParaRPr kumimoji="1" lang="ja-JP" altLang="en-US" dirty="0"/>
+            <a:endParaRPr kumimoji="1" lang="ja-JP" altLang="en-US" baseline="0" dirty="0">
+              <a:latin typeface="ＭＳ ゴシック" panose="020B0609070205080204" pitchFamily="49" charset="-128"/>
+              <a:ea typeface="ＭＳ ゴシック" panose="020B0609070205080204" pitchFamily="49" charset="-128"/>
+            </a:endParaRPr>
           </a:p>
         </p:txBody>
       </p:sp>
@@ -7479,71 +8027,111 @@
           <a:lstStyle/>
           <a:p>
             <a:r>
-              <a:rPr lang="ja-JP" altLang="en-US" dirty="0" smtClean="0"/>
+              <a:rPr lang="ja-JP" altLang="en-US" baseline="0" dirty="0" smtClean="0">
+                <a:latin typeface="ＭＳ ゴシック" panose="020B0609070205080204" pitchFamily="49" charset="-128"/>
+                <a:ea typeface="ＭＳ ゴシック" panose="020B0609070205080204" pitchFamily="49" charset="-128"/>
+              </a:rPr>
               <a:t>ルールは守る</a:t>
             </a:r>
-            <a:endParaRPr lang="en-US" altLang="ja-JP" dirty="0" smtClean="0"/>
+            <a:endParaRPr lang="en-US" altLang="ja-JP" baseline="0" dirty="0" smtClean="0">
+              <a:latin typeface="ＭＳ ゴシック" panose="020B0609070205080204" pitchFamily="49" charset="-128"/>
+              <a:ea typeface="ＭＳ ゴシック" panose="020B0609070205080204" pitchFamily="49" charset="-128"/>
+            </a:endParaRPr>
           </a:p>
           <a:p>
             <a:pPr lvl="1"/>
             <a:r>
-              <a:rPr lang="ja-JP" altLang="en-US" dirty="0" smtClean="0"/>
+              <a:rPr lang="ja-JP" altLang="en-US" baseline="0" dirty="0" smtClean="0">
+                <a:latin typeface="ＭＳ ゴシック" panose="020B0609070205080204" pitchFamily="49" charset="-128"/>
+                <a:ea typeface="ＭＳ ゴシック" panose="020B0609070205080204" pitchFamily="49" charset="-128"/>
+              </a:rPr>
               <a:t>質問時は挙手で行う</a:t>
             </a:r>
-            <a:endParaRPr lang="en-US" altLang="ja-JP" dirty="0" smtClean="0"/>
+            <a:endParaRPr lang="en-US" altLang="ja-JP" baseline="0" dirty="0" smtClean="0">
+              <a:latin typeface="ＭＳ ゴシック" panose="020B0609070205080204" pitchFamily="49" charset="-128"/>
+              <a:ea typeface="ＭＳ ゴシック" panose="020B0609070205080204" pitchFamily="49" charset="-128"/>
+            </a:endParaRPr>
           </a:p>
           <a:p>
             <a:pPr lvl="1"/>
             <a:r>
-              <a:rPr lang="ja-JP" altLang="en-US" dirty="0" smtClean="0"/>
+              <a:rPr lang="ja-JP" altLang="en-US" baseline="0" dirty="0" smtClean="0">
+                <a:latin typeface="ＭＳ ゴシック" panose="020B0609070205080204" pitchFamily="49" charset="-128"/>
+                <a:ea typeface="ＭＳ ゴシック" panose="020B0609070205080204" pitchFamily="49" charset="-128"/>
+              </a:rPr>
               <a:t>提出物の納期</a:t>
             </a:r>
             <a:r>
-              <a:rPr lang="en-US" altLang="ja-JP" dirty="0" smtClean="0"/>
+              <a:rPr lang="en-US" altLang="ja-JP" baseline="0" dirty="0" smtClean="0">
+                <a:latin typeface="ＭＳ ゴシック" panose="020B0609070205080204" pitchFamily="49" charset="-128"/>
+                <a:ea typeface="ＭＳ ゴシック" panose="020B0609070205080204" pitchFamily="49" charset="-128"/>
+              </a:rPr>
               <a:t>(</a:t>
             </a:r>
             <a:r>
-              <a:rPr lang="ja-JP" altLang="en-US" dirty="0" smtClean="0"/>
+              <a:rPr lang="ja-JP" altLang="en-US" baseline="0" dirty="0" smtClean="0">
+                <a:latin typeface="ＭＳ ゴシック" panose="020B0609070205080204" pitchFamily="49" charset="-128"/>
+                <a:ea typeface="ＭＳ ゴシック" panose="020B0609070205080204" pitchFamily="49" charset="-128"/>
+              </a:rPr>
               <a:t>課題提出</a:t>
             </a:r>
             <a:r>
-              <a:rPr lang="en-US" altLang="ja-JP" dirty="0" smtClean="0"/>
+              <a:rPr lang="en-US" altLang="ja-JP" baseline="0" dirty="0" smtClean="0">
+                <a:latin typeface="ＭＳ ゴシック" panose="020B0609070205080204" pitchFamily="49" charset="-128"/>
+                <a:ea typeface="ＭＳ ゴシック" panose="020B0609070205080204" pitchFamily="49" charset="-128"/>
+              </a:rPr>
               <a:t>)</a:t>
             </a:r>
           </a:p>
           <a:p>
             <a:pPr lvl="1"/>
             <a:r>
-              <a:rPr lang="ja-JP" altLang="en-US" dirty="0" smtClean="0"/>
+              <a:rPr lang="ja-JP" altLang="en-US" baseline="0" dirty="0" smtClean="0">
+                <a:latin typeface="ＭＳ ゴシック" panose="020B0609070205080204" pitchFamily="49" charset="-128"/>
+                <a:ea typeface="ＭＳ ゴシック" panose="020B0609070205080204" pitchFamily="49" charset="-128"/>
+              </a:rPr>
               <a:t>遅刻・欠席時の連絡</a:t>
             </a:r>
             <a:r>
-              <a:rPr lang="en-US" altLang="ja-JP" dirty="0" smtClean="0"/>
+              <a:rPr lang="en-US" altLang="ja-JP" baseline="0" dirty="0" smtClean="0">
+                <a:latin typeface="ＭＳ ゴシック" panose="020B0609070205080204" pitchFamily="49" charset="-128"/>
+                <a:ea typeface="ＭＳ ゴシック" panose="020B0609070205080204" pitchFamily="49" charset="-128"/>
+              </a:rPr>
               <a:t>(</a:t>
             </a:r>
             <a:r>
-              <a:rPr lang="ja-JP" altLang="en-US" dirty="0" smtClean="0"/>
+              <a:rPr lang="ja-JP" altLang="en-US" baseline="0" dirty="0" smtClean="0">
+                <a:latin typeface="ＭＳ ゴシック" panose="020B0609070205080204" pitchFamily="49" charset="-128"/>
+                <a:ea typeface="ＭＳ ゴシック" panose="020B0609070205080204" pitchFamily="49" charset="-128"/>
+              </a:rPr>
               <a:t>大橋校へ電話連絡を行い、メールや友人伝達は禁止</a:t>
             </a:r>
             <a:r>
-              <a:rPr lang="en-US" altLang="ja-JP" dirty="0" smtClean="0"/>
+              <a:rPr lang="en-US" altLang="ja-JP" baseline="0" dirty="0" smtClean="0">
+                <a:latin typeface="ＭＳ ゴシック" panose="020B0609070205080204" pitchFamily="49" charset="-128"/>
+                <a:ea typeface="ＭＳ ゴシック" panose="020B0609070205080204" pitchFamily="49" charset="-128"/>
+              </a:rPr>
               <a:t>)</a:t>
             </a:r>
           </a:p>
           <a:p>
             <a:pPr lvl="2"/>
             <a:r>
-              <a:rPr lang="en-US" altLang="ja-JP" dirty="0" smtClean="0">
+              <a:rPr lang="en-US" altLang="ja-JP" baseline="0" dirty="0" smtClean="0">
                 <a:solidFill>
                   <a:srgbClr val="FF0000"/>
                 </a:solidFill>
+                <a:latin typeface="ＭＳ ゴシック" panose="020B0609070205080204" pitchFamily="49" charset="-128"/>
+                <a:ea typeface="ＭＳ ゴシック" panose="020B0609070205080204" pitchFamily="49" charset="-128"/>
               </a:rPr>
               <a:t>TEL:092-512-7879</a:t>
             </a:r>
-            <a:endParaRPr lang="ja-JP" altLang="en-US" dirty="0" smtClean="0">
+            <a:endParaRPr lang="ja-JP" altLang="en-US" baseline="0" dirty="0" smtClean="0">
               <a:solidFill>
                 <a:srgbClr val="FF0000"/>
               </a:solidFill>
+              <a:latin typeface="ＭＳ ゴシック" panose="020B0609070205080204" pitchFamily="49" charset="-128"/>
+              <a:ea typeface="ＭＳ ゴシック" panose="020B0609070205080204" pitchFamily="49" charset="-128"/>
             </a:endParaRPr>
           </a:p>
         </p:txBody>
@@ -7596,18 +8184,16 @@
           <a:lstStyle/>
           <a:p>
             <a:r>
-              <a:rPr kumimoji="1" lang="ja-JP" altLang="en-US" dirty="0" smtClean="0"/>
-              <a:t>就職の</a:t>
-            </a:r>
-            <a:r>
-              <a:rPr kumimoji="1" lang="ja-JP" altLang="en-US" dirty="0" smtClean="0"/>
-              <a:t>意識に</a:t>
-            </a:r>
-            <a:r>
-              <a:rPr kumimoji="1" lang="ja-JP" altLang="en-US" dirty="0" smtClean="0"/>
-              <a:t>ついて</a:t>
-            </a:r>
-            <a:endParaRPr kumimoji="1" lang="ja-JP" altLang="en-US" dirty="0"/>
+              <a:rPr kumimoji="1" lang="ja-JP" altLang="en-US" baseline="0" dirty="0" smtClean="0">
+                <a:latin typeface="ＭＳ ゴシック" panose="020B0609070205080204" pitchFamily="49" charset="-128"/>
+                <a:ea typeface="ＭＳ ゴシック" panose="020B0609070205080204" pitchFamily="49" charset="-128"/>
+              </a:rPr>
+              <a:t>就職の意識について</a:t>
+            </a:r>
+            <a:endParaRPr kumimoji="1" lang="ja-JP" altLang="en-US" baseline="0" dirty="0">
+              <a:latin typeface="ＭＳ ゴシック" panose="020B0609070205080204" pitchFamily="49" charset="-128"/>
+              <a:ea typeface="ＭＳ ゴシック" panose="020B0609070205080204" pitchFamily="49" charset="-128"/>
+            </a:endParaRPr>
           </a:p>
         </p:txBody>
       </p:sp>
@@ -7627,31 +8213,55 @@
           <a:lstStyle/>
           <a:p>
             <a:r>
-              <a:rPr kumimoji="1" lang="ja-JP" altLang="en-US" dirty="0" smtClean="0"/>
+              <a:rPr kumimoji="1" lang="ja-JP" altLang="en-US" baseline="0" dirty="0" smtClean="0">
+                <a:latin typeface="ＭＳ ゴシック" panose="020B0609070205080204" pitchFamily="49" charset="-128"/>
+                <a:ea typeface="ＭＳ ゴシック" panose="020B0609070205080204" pitchFamily="49" charset="-128"/>
+              </a:rPr>
               <a:t>時間について</a:t>
             </a:r>
-            <a:endParaRPr kumimoji="1" lang="en-US" altLang="ja-JP" dirty="0" smtClean="0"/>
-          </a:p>
-          <a:p>
-            <a:r>
-              <a:rPr kumimoji="1" lang="ja-JP" altLang="en-US" dirty="0" smtClean="0"/>
+            <a:endParaRPr kumimoji="1" lang="en-US" altLang="ja-JP" baseline="0" dirty="0" smtClean="0">
+              <a:latin typeface="ＭＳ ゴシック" panose="020B0609070205080204" pitchFamily="49" charset="-128"/>
+              <a:ea typeface="ＭＳ ゴシック" panose="020B0609070205080204" pitchFamily="49" charset="-128"/>
+            </a:endParaRPr>
+          </a:p>
+          <a:p>
+            <a:r>
+              <a:rPr kumimoji="1" lang="ja-JP" altLang="en-US" baseline="0" dirty="0" smtClean="0">
+                <a:latin typeface="ＭＳ ゴシック" panose="020B0609070205080204" pitchFamily="49" charset="-128"/>
+                <a:ea typeface="ＭＳ ゴシック" panose="020B0609070205080204" pitchFamily="49" charset="-128"/>
+              </a:rPr>
               <a:t>休暇について</a:t>
             </a:r>
-            <a:endParaRPr kumimoji="1" lang="en-US" altLang="ja-JP" dirty="0" smtClean="0"/>
-          </a:p>
-          <a:p>
-            <a:r>
-              <a:rPr kumimoji="1" lang="ja-JP" altLang="en-US" dirty="0" smtClean="0"/>
+            <a:endParaRPr kumimoji="1" lang="en-US" altLang="ja-JP" baseline="0" dirty="0" smtClean="0">
+              <a:latin typeface="ＭＳ ゴシック" panose="020B0609070205080204" pitchFamily="49" charset="-128"/>
+              <a:ea typeface="ＭＳ ゴシック" panose="020B0609070205080204" pitchFamily="49" charset="-128"/>
+            </a:endParaRPr>
+          </a:p>
+          <a:p>
+            <a:r>
+              <a:rPr kumimoji="1" lang="ja-JP" altLang="en-US" baseline="0" dirty="0" smtClean="0">
+                <a:latin typeface="ＭＳ ゴシック" panose="020B0609070205080204" pitchFamily="49" charset="-128"/>
+                <a:ea typeface="ＭＳ ゴシック" panose="020B0609070205080204" pitchFamily="49" charset="-128"/>
+              </a:rPr>
               <a:t>出席について</a:t>
             </a:r>
-            <a:endParaRPr kumimoji="1" lang="en-US" altLang="ja-JP" dirty="0" smtClean="0"/>
-          </a:p>
-          <a:p>
-            <a:r>
-              <a:rPr kumimoji="1" lang="ja-JP" altLang="en-US" dirty="0" smtClean="0"/>
+            <a:endParaRPr kumimoji="1" lang="en-US" altLang="ja-JP" baseline="0" dirty="0" smtClean="0">
+              <a:latin typeface="ＭＳ ゴシック" panose="020B0609070205080204" pitchFamily="49" charset="-128"/>
+              <a:ea typeface="ＭＳ ゴシック" panose="020B0609070205080204" pitchFamily="49" charset="-128"/>
+            </a:endParaRPr>
+          </a:p>
+          <a:p>
+            <a:r>
+              <a:rPr kumimoji="1" lang="ja-JP" altLang="en-US" baseline="0" dirty="0" smtClean="0">
+                <a:latin typeface="ＭＳ ゴシック" panose="020B0609070205080204" pitchFamily="49" charset="-128"/>
+                <a:ea typeface="ＭＳ ゴシック" panose="020B0609070205080204" pitchFamily="49" charset="-128"/>
+              </a:rPr>
               <a:t>帰国のリスクについて</a:t>
             </a:r>
-            <a:endParaRPr kumimoji="1" lang="en-US" altLang="ja-JP" dirty="0" smtClean="0"/>
+            <a:endParaRPr kumimoji="1" lang="en-US" altLang="ja-JP" baseline="0" dirty="0" smtClean="0">
+              <a:latin typeface="ＭＳ ゴシック" panose="020B0609070205080204" pitchFamily="49" charset="-128"/>
+              <a:ea typeface="ＭＳ ゴシック" panose="020B0609070205080204" pitchFamily="49" charset="-128"/>
+            </a:endParaRPr>
           </a:p>
         </p:txBody>
       </p:sp>
@@ -7701,10 +8311,16 @@
           <a:lstStyle/>
           <a:p>
             <a:r>
-              <a:rPr kumimoji="1" lang="ja-JP" altLang="en-US" dirty="0" smtClean="0"/>
+              <a:rPr kumimoji="1" lang="ja-JP" altLang="en-US" baseline="0" dirty="0" smtClean="0">
+                <a:latin typeface="ＭＳ ゴシック" panose="020B0609070205080204" pitchFamily="49" charset="-128"/>
+                <a:ea typeface="ＭＳ ゴシック" panose="020B0609070205080204" pitchFamily="49" charset="-128"/>
+              </a:rPr>
               <a:t>学校求人とは</a:t>
             </a:r>
-            <a:endParaRPr kumimoji="1" lang="ja-JP" altLang="en-US" dirty="0"/>
+            <a:endParaRPr kumimoji="1" lang="ja-JP" altLang="en-US" baseline="0" dirty="0">
+              <a:latin typeface="ＭＳ ゴシック" panose="020B0609070205080204" pitchFamily="49" charset="-128"/>
+              <a:ea typeface="ＭＳ ゴシック" panose="020B0609070205080204" pitchFamily="49" charset="-128"/>
+            </a:endParaRPr>
           </a:p>
         </p:txBody>
       </p:sp>
@@ -7773,10 +8389,16 @@
           <a:lstStyle/>
           <a:p>
             <a:r>
-              <a:rPr kumimoji="1" lang="ja-JP" altLang="en-US" dirty="0" smtClean="0"/>
+              <a:rPr kumimoji="1" lang="ja-JP" altLang="en-US" baseline="0" dirty="0" smtClean="0">
+                <a:latin typeface="ＭＳ ゴシック" panose="020B0609070205080204" pitchFamily="49" charset="-128"/>
+                <a:ea typeface="ＭＳ ゴシック" panose="020B0609070205080204" pitchFamily="49" charset="-128"/>
+              </a:rPr>
               <a:t>学校推薦（推薦書）</a:t>
             </a:r>
-            <a:endParaRPr kumimoji="1" lang="ja-JP" altLang="en-US" dirty="0"/>
+            <a:endParaRPr kumimoji="1" lang="ja-JP" altLang="en-US" baseline="0" dirty="0">
+              <a:latin typeface="ＭＳ ゴシック" panose="020B0609070205080204" pitchFamily="49" charset="-128"/>
+              <a:ea typeface="ＭＳ ゴシック" panose="020B0609070205080204" pitchFamily="49" charset="-128"/>
+            </a:endParaRPr>
           </a:p>
         </p:txBody>
       </p:sp>
@@ -7796,72 +8418,126 @@
           <a:lstStyle/>
           <a:p>
             <a:r>
-              <a:rPr kumimoji="1" lang="ja-JP" altLang="en-US" dirty="0" smtClean="0"/>
+              <a:rPr kumimoji="1" lang="ja-JP" altLang="en-US" baseline="0" dirty="0" smtClean="0">
+                <a:latin typeface="ＭＳ ゴシック" panose="020B0609070205080204" pitchFamily="49" charset="-128"/>
+                <a:ea typeface="ＭＳ ゴシック" panose="020B0609070205080204" pitchFamily="49" charset="-128"/>
+              </a:rPr>
               <a:t>出席率８５％以上</a:t>
             </a:r>
-            <a:endParaRPr kumimoji="1" lang="en-US" altLang="ja-JP" dirty="0" smtClean="0"/>
-          </a:p>
-          <a:p>
-            <a:r>
-              <a:rPr kumimoji="1" lang="ja-JP" altLang="en-US" dirty="0" smtClean="0"/>
+            <a:endParaRPr kumimoji="1" lang="en-US" altLang="ja-JP" baseline="0" dirty="0" smtClean="0">
+              <a:latin typeface="ＭＳ ゴシック" panose="020B0609070205080204" pitchFamily="49" charset="-128"/>
+              <a:ea typeface="ＭＳ ゴシック" panose="020B0609070205080204" pitchFamily="49" charset="-128"/>
+            </a:endParaRPr>
+          </a:p>
+          <a:p>
+            <a:r>
+              <a:rPr kumimoji="1" lang="ja-JP" altLang="en-US" baseline="0" dirty="0" smtClean="0">
+                <a:latin typeface="ＭＳ ゴシック" panose="020B0609070205080204" pitchFamily="49" charset="-128"/>
+                <a:ea typeface="ＭＳ ゴシック" panose="020B0609070205080204" pitchFamily="49" charset="-128"/>
+              </a:rPr>
               <a:t>成績の平均３．５以上</a:t>
             </a:r>
-            <a:endParaRPr kumimoji="1" lang="en-US" altLang="ja-JP" dirty="0" smtClean="0"/>
-          </a:p>
-          <a:p>
-            <a:r>
-              <a:rPr kumimoji="1" lang="ja-JP" altLang="en-US" dirty="0" smtClean="0"/>
+            <a:endParaRPr kumimoji="1" lang="en-US" altLang="ja-JP" baseline="0" dirty="0" smtClean="0">
+              <a:latin typeface="ＭＳ ゴシック" panose="020B0609070205080204" pitchFamily="49" charset="-128"/>
+              <a:ea typeface="ＭＳ ゴシック" panose="020B0609070205080204" pitchFamily="49" charset="-128"/>
+            </a:endParaRPr>
+          </a:p>
+          <a:p>
+            <a:r>
+              <a:rPr kumimoji="1" lang="ja-JP" altLang="en-US" baseline="0" dirty="0" smtClean="0">
+                <a:latin typeface="ＭＳ ゴシック" panose="020B0609070205080204" pitchFamily="49" charset="-128"/>
+                <a:ea typeface="ＭＳ ゴシック" panose="020B0609070205080204" pitchFamily="49" charset="-128"/>
+              </a:rPr>
               <a:t>評価点２（４４点がない事）</a:t>
             </a:r>
-            <a:endParaRPr kumimoji="1" lang="en-US" altLang="ja-JP" dirty="0" smtClean="0"/>
-          </a:p>
-          <a:p>
-            <a:r>
-              <a:rPr kumimoji="1" lang="ja-JP" altLang="en-US" dirty="0" smtClean="0"/>
+            <a:endParaRPr kumimoji="1" lang="en-US" altLang="ja-JP" baseline="0" dirty="0" smtClean="0">
+              <a:latin typeface="ＭＳ ゴシック" panose="020B0609070205080204" pitchFamily="49" charset="-128"/>
+              <a:ea typeface="ＭＳ ゴシック" panose="020B0609070205080204" pitchFamily="49" charset="-128"/>
+            </a:endParaRPr>
+          </a:p>
+          <a:p>
+            <a:r>
+              <a:rPr kumimoji="1" lang="ja-JP" altLang="en-US" baseline="0" dirty="0" smtClean="0">
+                <a:latin typeface="ＭＳ ゴシック" panose="020B0609070205080204" pitchFamily="49" charset="-128"/>
+                <a:ea typeface="ＭＳ ゴシック" panose="020B0609070205080204" pitchFamily="49" charset="-128"/>
+              </a:rPr>
               <a:t>日本語能力認定試験</a:t>
             </a:r>
             <a:r>
-              <a:rPr kumimoji="1" lang="en-US" altLang="ja-JP" dirty="0" smtClean="0"/>
+              <a:rPr kumimoji="1" lang="en-US" altLang="ja-JP" baseline="0" dirty="0" smtClean="0">
+                <a:latin typeface="ＭＳ ゴシック" panose="020B0609070205080204" pitchFamily="49" charset="-128"/>
+                <a:ea typeface="ＭＳ ゴシック" panose="020B0609070205080204" pitchFamily="49" charset="-128"/>
+              </a:rPr>
               <a:t>N1</a:t>
             </a:r>
             <a:r>
-              <a:rPr kumimoji="1" lang="ja-JP" altLang="en-US" dirty="0" err="1" smtClean="0"/>
+              <a:rPr kumimoji="1" lang="ja-JP" altLang="en-US" baseline="0" dirty="0" err="1" smtClean="0">
+                <a:latin typeface="ＭＳ ゴシック" panose="020B0609070205080204" pitchFamily="49" charset="-128"/>
+                <a:ea typeface="ＭＳ ゴシック" panose="020B0609070205080204" pitchFamily="49" charset="-128"/>
+              </a:rPr>
               <a:t>、</a:t>
             </a:r>
             <a:r>
-              <a:rPr kumimoji="1" lang="en-US" altLang="ja-JP" dirty="0" smtClean="0"/>
+              <a:rPr kumimoji="1" lang="en-US" altLang="ja-JP" baseline="0" dirty="0" smtClean="0">
+                <a:latin typeface="ＭＳ ゴシック" panose="020B0609070205080204" pitchFamily="49" charset="-128"/>
+                <a:ea typeface="ＭＳ ゴシック" panose="020B0609070205080204" pitchFamily="49" charset="-128"/>
+              </a:rPr>
               <a:t>N2</a:t>
             </a:r>
             <a:r>
-              <a:rPr kumimoji="1" lang="ja-JP" altLang="en-US" dirty="0" smtClean="0"/>
+              <a:rPr kumimoji="1" lang="ja-JP" altLang="en-US" baseline="0" dirty="0" smtClean="0">
+                <a:latin typeface="ＭＳ ゴシック" panose="020B0609070205080204" pitchFamily="49" charset="-128"/>
+                <a:ea typeface="ＭＳ ゴシック" panose="020B0609070205080204" pitchFamily="49" charset="-128"/>
+              </a:rPr>
               <a:t>に合格している事</a:t>
             </a:r>
-            <a:endParaRPr kumimoji="1" lang="en-US" altLang="ja-JP" dirty="0" smtClean="0"/>
-          </a:p>
-          <a:p>
-            <a:r>
-              <a:rPr kumimoji="1" lang="ja-JP" altLang="en-US" dirty="0" smtClean="0"/>
+            <a:endParaRPr kumimoji="1" lang="en-US" altLang="ja-JP" baseline="0" dirty="0" smtClean="0">
+              <a:latin typeface="ＭＳ ゴシック" panose="020B0609070205080204" pitchFamily="49" charset="-128"/>
+              <a:ea typeface="ＭＳ ゴシック" panose="020B0609070205080204" pitchFamily="49" charset="-128"/>
+            </a:endParaRPr>
+          </a:p>
+          <a:p>
+            <a:r>
+              <a:rPr kumimoji="1" lang="ja-JP" altLang="en-US" baseline="0" dirty="0" smtClean="0">
+                <a:latin typeface="ＭＳ ゴシック" panose="020B0609070205080204" pitchFamily="49" charset="-128"/>
+                <a:ea typeface="ＭＳ ゴシック" panose="020B0609070205080204" pitchFamily="49" charset="-128"/>
+              </a:rPr>
               <a:t>素行に問題が無い事</a:t>
             </a:r>
-            <a:endParaRPr kumimoji="1" lang="en-US" altLang="ja-JP" dirty="0" smtClean="0"/>
+            <a:endParaRPr kumimoji="1" lang="en-US" altLang="ja-JP" baseline="0" dirty="0" smtClean="0">
+              <a:latin typeface="ＭＳ ゴシック" panose="020B0609070205080204" pitchFamily="49" charset="-128"/>
+              <a:ea typeface="ＭＳ ゴシック" panose="020B0609070205080204" pitchFamily="49" charset="-128"/>
+            </a:endParaRPr>
           </a:p>
           <a:p>
             <a:pPr marL="0" indent="0" algn="r">
               <a:buNone/>
             </a:pPr>
             <a:r>
-              <a:rPr kumimoji="1" lang="ja-JP" altLang="en-US" dirty="0" smtClean="0"/>
+              <a:rPr kumimoji="1" lang="ja-JP" altLang="en-US" baseline="0" dirty="0" smtClean="0">
+                <a:latin typeface="ＭＳ ゴシック" panose="020B0609070205080204" pitchFamily="49" charset="-128"/>
+                <a:ea typeface="ＭＳ ゴシック" panose="020B0609070205080204" pitchFamily="49" charset="-128"/>
+              </a:rPr>
               <a:t>学則</a:t>
             </a:r>
             <a:r>
-              <a:rPr kumimoji="1" lang="en-US" altLang="ja-JP" dirty="0" smtClean="0"/>
+              <a:rPr kumimoji="1" lang="en-US" altLang="ja-JP" baseline="0" dirty="0" smtClean="0">
+                <a:latin typeface="ＭＳ ゴシック" panose="020B0609070205080204" pitchFamily="49" charset="-128"/>
+                <a:ea typeface="ＭＳ ゴシック" panose="020B0609070205080204" pitchFamily="49" charset="-128"/>
+              </a:rPr>
               <a:t>2016</a:t>
             </a:r>
             <a:r>
-              <a:rPr kumimoji="1" lang="ja-JP" altLang="en-US" dirty="0" smtClean="0"/>
+              <a:rPr kumimoji="1" lang="ja-JP" altLang="en-US" baseline="0" dirty="0" smtClean="0">
+                <a:latin typeface="ＭＳ ゴシック" panose="020B0609070205080204" pitchFamily="49" charset="-128"/>
+                <a:ea typeface="ＭＳ ゴシック" panose="020B0609070205080204" pitchFamily="49" charset="-128"/>
+              </a:rPr>
               <a:t>年度版より</a:t>
             </a:r>
-            <a:endParaRPr kumimoji="1" lang="en-US" altLang="ja-JP" dirty="0" smtClean="0"/>
+            <a:endParaRPr kumimoji="1" lang="en-US" altLang="ja-JP" baseline="0" dirty="0" smtClean="0">
+              <a:latin typeface="ＭＳ ゴシック" panose="020B0609070205080204" pitchFamily="49" charset="-128"/>
+              <a:ea typeface="ＭＳ ゴシック" panose="020B0609070205080204" pitchFamily="49" charset="-128"/>
+            </a:endParaRPr>
           </a:p>
         </p:txBody>
       </p:sp>
@@ -8443,4 +9119,289 @@
   <a:objectDefaults/>
   <a:extraClrSchemeLst/>
 </a:theme>
+</file>
+
+<file path=ppt/theme/theme3.xml><?xml version="1.0" encoding="utf-8"?>
+<a:theme xmlns:a="http://schemas.openxmlformats.org/drawingml/2006/main" name="Office ​​テーマ">
+  <a:themeElements>
+    <a:clrScheme name="Office">
+      <a:dk1>
+        <a:sysClr val="windowText" lastClr="000000"/>
+      </a:dk1>
+      <a:lt1>
+        <a:sysClr val="window" lastClr="FFFFFF"/>
+      </a:lt1>
+      <a:dk2>
+        <a:srgbClr val="1F497D"/>
+      </a:dk2>
+      <a:lt2>
+        <a:srgbClr val="EEECE1"/>
+      </a:lt2>
+      <a:accent1>
+        <a:srgbClr val="4F81BD"/>
+      </a:accent1>
+      <a:accent2>
+        <a:srgbClr val="C0504D"/>
+      </a:accent2>
+      <a:accent3>
+        <a:srgbClr val="9BBB59"/>
+      </a:accent3>
+      <a:accent4>
+        <a:srgbClr val="8064A2"/>
+      </a:accent4>
+      <a:accent5>
+        <a:srgbClr val="4BACC6"/>
+      </a:accent5>
+      <a:accent6>
+        <a:srgbClr val="F79646"/>
+      </a:accent6>
+      <a:hlink>
+        <a:srgbClr val="0000FF"/>
+      </a:hlink>
+      <a:folHlink>
+        <a:srgbClr val="800080"/>
+      </a:folHlink>
+    </a:clrScheme>
+    <a:fontScheme name="Office">
+      <a:majorFont>
+        <a:latin typeface="Calibri"/>
+        <a:ea typeface=""/>
+        <a:cs typeface=""/>
+        <a:font script="Jpan" typeface="ＭＳ Ｐゴシック"/>
+        <a:font script="Hang" typeface="맑은 고딕"/>
+        <a:font script="Hans" typeface="宋体"/>
+        <a:font script="Hant" typeface="新細明體"/>
+        <a:font script="Arab" typeface="Times New Roman"/>
+        <a:font script="Hebr" typeface="Times New Roman"/>
+        <a:font script="Thai" typeface="Angsana New"/>
+        <a:font script="Ethi" typeface="Nyala"/>
+        <a:font script="Beng" typeface="Vrinda"/>
+        <a:font script="Gujr" typeface="Shruti"/>
+        <a:font script="Khmr" typeface="MoolBoran"/>
+        <a:font script="Knda" typeface="Tunga"/>
+        <a:font script="Guru" typeface="Raavi"/>
+        <a:font script="Cans" typeface="Euphemia"/>
+        <a:font script="Cher" typeface="Plantagenet Cherokee"/>
+        <a:font script="Yiii" typeface="Microsoft Yi Baiti"/>
+        <a:font script="Tibt" typeface="Microsoft Himalaya"/>
+        <a:font script="Thaa" typeface="MV Boli"/>
+        <a:font script="Deva" typeface="Mangal"/>
+        <a:font script="Telu" typeface="Gautami"/>
+        <a:font script="Taml" typeface="Latha"/>
+        <a:font script="Syrc" typeface="Estrangelo Edessa"/>
+        <a:font script="Orya" typeface="Kalinga"/>
+        <a:font script="Mlym" typeface="Kartika"/>
+        <a:font script="Laoo" typeface="DokChampa"/>
+        <a:font script="Sinh" typeface="Iskoola Pota"/>
+        <a:font script="Mong" typeface="Mongolian Baiti"/>
+        <a:font script="Viet" typeface="Times New Roman"/>
+        <a:font script="Uigh" typeface="Microsoft Uighur"/>
+        <a:font script="Geor" typeface="Sylfaen"/>
+      </a:majorFont>
+      <a:minorFont>
+        <a:latin typeface="Calibri"/>
+        <a:ea typeface=""/>
+        <a:cs typeface=""/>
+        <a:font script="Jpan" typeface="ＭＳ Ｐゴシック"/>
+        <a:font script="Hang" typeface="맑은 고딕"/>
+        <a:font script="Hans" typeface="宋体"/>
+        <a:font script="Hant" typeface="新細明體"/>
+        <a:font script="Arab" typeface="Arial"/>
+        <a:font script="Hebr" typeface="Arial"/>
+        <a:font script="Thai" typeface="Cordia New"/>
+        <a:font script="Ethi" typeface="Nyala"/>
+        <a:font script="Beng" typeface="Vrinda"/>
+        <a:font script="Gujr" typeface="Shruti"/>
+        <a:font script="Khmr" typeface="DaunPenh"/>
+        <a:font script="Knda" typeface="Tunga"/>
+        <a:font script="Guru" typeface="Raavi"/>
+        <a:font script="Cans" typeface="Euphemia"/>
+        <a:font script="Cher" typeface="Plantagenet Cherokee"/>
+        <a:font script="Yiii" typeface="Microsoft Yi Baiti"/>
+        <a:font script="Tibt" typeface="Microsoft Himalaya"/>
+        <a:font script="Thaa" typeface="MV Boli"/>
+        <a:font script="Deva" typeface="Mangal"/>
+        <a:font script="Telu" typeface="Gautami"/>
+        <a:font script="Taml" typeface="Latha"/>
+        <a:font script="Syrc" typeface="Estrangelo Edessa"/>
+        <a:font script="Orya" typeface="Kalinga"/>
+        <a:font script="Mlym" typeface="Kartika"/>
+        <a:font script="Laoo" typeface="DokChampa"/>
+        <a:font script="Sinh" typeface="Iskoola Pota"/>
+        <a:font script="Mong" typeface="Mongolian Baiti"/>
+        <a:font script="Viet" typeface="Arial"/>
+        <a:font script="Uigh" typeface="Microsoft Uighur"/>
+        <a:font script="Geor" typeface="Sylfaen"/>
+      </a:minorFont>
+    </a:fontScheme>
+    <a:fmtScheme name="Office">
+      <a:fillStyleLst>
+        <a:solidFill>
+          <a:schemeClr val="phClr"/>
+        </a:solidFill>
+        <a:gradFill rotWithShape="1">
+          <a:gsLst>
+            <a:gs pos="0">
+              <a:schemeClr val="phClr">
+                <a:tint val="50000"/>
+                <a:satMod val="300000"/>
+              </a:schemeClr>
+            </a:gs>
+            <a:gs pos="35000">
+              <a:schemeClr val="phClr">
+                <a:tint val="37000"/>
+                <a:satMod val="300000"/>
+              </a:schemeClr>
+            </a:gs>
+            <a:gs pos="100000">
+              <a:schemeClr val="phClr">
+                <a:tint val="15000"/>
+                <a:satMod val="350000"/>
+              </a:schemeClr>
+            </a:gs>
+          </a:gsLst>
+          <a:lin ang="16200000" scaled="1"/>
+        </a:gradFill>
+        <a:gradFill rotWithShape="1">
+          <a:gsLst>
+            <a:gs pos="0">
+              <a:schemeClr val="phClr">
+                <a:shade val="51000"/>
+                <a:satMod val="130000"/>
+              </a:schemeClr>
+            </a:gs>
+            <a:gs pos="80000">
+              <a:schemeClr val="phClr">
+                <a:shade val="93000"/>
+                <a:satMod val="130000"/>
+              </a:schemeClr>
+            </a:gs>
+            <a:gs pos="100000">
+              <a:schemeClr val="phClr">
+                <a:shade val="94000"/>
+                <a:satMod val="135000"/>
+              </a:schemeClr>
+            </a:gs>
+          </a:gsLst>
+          <a:lin ang="16200000" scaled="0"/>
+        </a:gradFill>
+      </a:fillStyleLst>
+      <a:lnStyleLst>
+        <a:ln w="9525" cap="flat" cmpd="sng" algn="ctr">
+          <a:solidFill>
+            <a:schemeClr val="phClr">
+              <a:shade val="95000"/>
+              <a:satMod val="105000"/>
+            </a:schemeClr>
+          </a:solidFill>
+          <a:prstDash val="solid"/>
+        </a:ln>
+        <a:ln w="25400" cap="flat" cmpd="sng" algn="ctr">
+          <a:solidFill>
+            <a:schemeClr val="phClr"/>
+          </a:solidFill>
+          <a:prstDash val="solid"/>
+        </a:ln>
+        <a:ln w="38100" cap="flat" cmpd="sng" algn="ctr">
+          <a:solidFill>
+            <a:schemeClr val="phClr"/>
+          </a:solidFill>
+          <a:prstDash val="solid"/>
+        </a:ln>
+      </a:lnStyleLst>
+      <a:effectStyleLst>
+        <a:effectStyle>
+          <a:effectLst>
+            <a:outerShdw blurRad="40000" dist="20000" dir="5400000" rotWithShape="0">
+              <a:srgbClr val="000000">
+                <a:alpha val="38000"/>
+              </a:srgbClr>
+            </a:outerShdw>
+          </a:effectLst>
+        </a:effectStyle>
+        <a:effectStyle>
+          <a:effectLst>
+            <a:outerShdw blurRad="40000" dist="23000" dir="5400000" rotWithShape="0">
+              <a:srgbClr val="000000">
+                <a:alpha val="35000"/>
+              </a:srgbClr>
+            </a:outerShdw>
+          </a:effectLst>
+        </a:effectStyle>
+        <a:effectStyle>
+          <a:effectLst>
+            <a:outerShdw blurRad="40000" dist="23000" dir="5400000" rotWithShape="0">
+              <a:srgbClr val="000000">
+                <a:alpha val="35000"/>
+              </a:srgbClr>
+            </a:outerShdw>
+          </a:effectLst>
+          <a:scene3d>
+            <a:camera prst="orthographicFront">
+              <a:rot lat="0" lon="0" rev="0"/>
+            </a:camera>
+            <a:lightRig rig="threePt" dir="t">
+              <a:rot lat="0" lon="0" rev="1200000"/>
+            </a:lightRig>
+          </a:scene3d>
+          <a:sp3d>
+            <a:bevelT w="63500" h="25400"/>
+          </a:sp3d>
+        </a:effectStyle>
+      </a:effectStyleLst>
+      <a:bgFillStyleLst>
+        <a:solidFill>
+          <a:schemeClr val="phClr"/>
+        </a:solidFill>
+        <a:gradFill rotWithShape="1">
+          <a:gsLst>
+            <a:gs pos="0">
+              <a:schemeClr val="phClr">
+                <a:tint val="40000"/>
+                <a:satMod val="350000"/>
+              </a:schemeClr>
+            </a:gs>
+            <a:gs pos="40000">
+              <a:schemeClr val="phClr">
+                <a:tint val="45000"/>
+                <a:shade val="99000"/>
+                <a:satMod val="350000"/>
+              </a:schemeClr>
+            </a:gs>
+            <a:gs pos="100000">
+              <a:schemeClr val="phClr">
+                <a:shade val="20000"/>
+                <a:satMod val="255000"/>
+              </a:schemeClr>
+            </a:gs>
+          </a:gsLst>
+          <a:path path="circle">
+            <a:fillToRect l="50000" t="-80000" r="50000" b="180000"/>
+          </a:path>
+        </a:gradFill>
+        <a:gradFill rotWithShape="1">
+          <a:gsLst>
+            <a:gs pos="0">
+              <a:schemeClr val="phClr">
+                <a:tint val="80000"/>
+                <a:satMod val="300000"/>
+              </a:schemeClr>
+            </a:gs>
+            <a:gs pos="100000">
+              <a:schemeClr val="phClr">
+                <a:shade val="30000"/>
+                <a:satMod val="200000"/>
+              </a:schemeClr>
+            </a:gs>
+          </a:gsLst>
+          <a:path path="circle">
+            <a:fillToRect l="50000" t="50000" r="50000" b="50000"/>
+          </a:path>
+        </a:gradFill>
+      </a:bgFillStyleLst>
+    </a:fmtScheme>
+  </a:themeElements>
+  <a:objectDefaults/>
+  <a:extraClrSchemeLst/>
+</a:theme>
 </file>
</xml_diff>